<commit_message>
CS 220 Format Lec 18 pptx
</commit_message>
<xml_diff>
--- a/tyler/meena/cs220/s20/materials/lec_18_S20.pptx
+++ b/tyler/meena/cs220/s20/materials/lec_18_S20.pptx
@@ -3175,8 +3175,8 @@
         </p:nvSpPr>
         <p:spPr bwMode="auto">
           <a:xfrm>
-            <a:off x="7721600" y="7309425"/>
-            <a:ext cx="4495800" cy="471924"/>
+            <a:off x="7721600" y="7124759"/>
+            <a:ext cx="4495800" cy="841256"/>
           </a:xfrm>
           <a:prstGeom prst="rect">
             <a:avLst/>
@@ -3342,6 +3342,16 @@
                 <a:sym typeface="Helvetica Neue" panose="02000503000000020004" pitchFamily="2" charset="0"/>
               </a:rPr>
               <a:t>Cheaters caught: 0</a:t>
+            </a:r>
+          </a:p>
+          <a:p>
+            <a:pPr algn="ctr" eaLnBrk="1"/>
+            <a:r>
+              <a:rPr lang="en-US" altLang="en-US" dirty="0">
+                <a:latin typeface="Helvetica Neue" panose="02000503000000020004" pitchFamily="2" charset="0"/>
+                <a:sym typeface="Helvetica Neue" panose="02000503000000020004" pitchFamily="2" charset="0"/>
+              </a:rPr>
+              <a:t>(Through P4)</a:t>
             </a:r>
           </a:p>
         </p:txBody>
@@ -5789,7 +5799,7 @@
         </p:nvSpPr>
         <p:spPr>
           <a:xfrm>
-            <a:off x="2567996" y="5791034"/>
+            <a:off x="2675572" y="5791034"/>
             <a:ext cx="831917" cy="1020515"/>
           </a:xfrm>
           <a:custGeom>
@@ -5852,7 +5862,7 @@
         </p:nvSpPr>
         <p:spPr>
           <a:xfrm>
-            <a:off x="3505200" y="6538417"/>
+            <a:off x="3585882" y="6538417"/>
             <a:ext cx="8004870" cy="457201"/>
           </a:xfrm>
           <a:prstGeom prst="rect">
@@ -5886,6 +5896,7 @@
           </a:lstStyle>
           <a:p>
             <a:r>
+              <a:rPr dirty="0"/>
               <a:t>a dictionary would let us give 700 a label other than it’s position</a:t>
             </a:r>
           </a:p>
@@ -8300,7 +8311,7 @@
         </p:nvSpPr>
         <p:spPr>
           <a:xfrm>
-            <a:off x="4204543" y="7258248"/>
+            <a:off x="4339013" y="7258248"/>
             <a:ext cx="405161" cy="342504"/>
           </a:xfrm>
           <a:prstGeom prst="rightArrow">
@@ -15105,6 +15116,7 @@
               <a:buNone/>
             </a:pPr>
             <a:r>
+              <a:rPr dirty="0"/>
               <a:t>Definition (from Wikipedia):</a:t>
             </a:r>
           </a:p>
@@ -15114,17 +15126,19 @@
               <a:buNone/>
             </a:pPr>
             <a:r>
+              <a:rPr dirty="0"/>
               <a:t>a </a:t>
             </a:r>
             <a:r>
-              <a:rPr b="1"/>
+              <a:rPr b="1" dirty="0"/>
               <a:t>data structure</a:t>
             </a:r>
             <a:r>
+              <a:rPr dirty="0"/>
               <a:t> is a </a:t>
             </a:r>
             <a:r>
-              <a:rPr b="1">
+              <a:rPr b="1" dirty="0">
                 <a:solidFill>
                   <a:schemeClr val="accent4">
                     <a:hueOff val="-1081314"/>
@@ -15136,14 +15150,18 @@
               <a:t>collection of data values</a:t>
             </a:r>
             <a:r>
+              <a:rPr dirty="0"/>
               <a:t>,</a:t>
             </a:r>
-            <a:br/>
-            <a:r>
+            <a:br>
+              <a:rPr dirty="0"/>
+            </a:br>
+            <a:r>
+              <a:rPr dirty="0"/>
               <a:t>the </a:t>
             </a:r>
             <a:r>
-              <a:rPr b="1">
+              <a:rPr b="1" dirty="0">
                 <a:solidFill>
                   <a:schemeClr val="accent4">
                     <a:hueOff val="-1081314"/>
@@ -15155,14 +15173,18 @@
               <a:t>relationships</a:t>
             </a:r>
             <a:r>
+              <a:rPr dirty="0"/>
               <a:t> among them,</a:t>
             </a:r>
-            <a:br/>
-            <a:r>
+            <a:br>
+              <a:rPr dirty="0"/>
+            </a:br>
+            <a:r>
+              <a:rPr dirty="0"/>
               <a:t>and the functions or </a:t>
             </a:r>
             <a:r>
-              <a:rPr b="1">
+              <a:rPr b="1" dirty="0">
                 <a:solidFill>
                   <a:schemeClr val="accent4">
                     <a:hueOff val="-1081314"/>
@@ -15173,8 +15195,11 @@
               </a:rPr>
               <a:t>operations</a:t>
             </a:r>
-            <a:br/>
-            <a:r>
+            <a:br>
+              <a:rPr dirty="0"/>
+            </a:br>
+            <a:r>
+              <a:rPr dirty="0"/>
               <a:t>that can be applied to the data</a:t>
             </a:r>
           </a:p>
@@ -15188,7 +15213,7 @@
         </p:nvSpPr>
         <p:spPr>
           <a:xfrm>
-            <a:off x="8166100" y="3185814"/>
+            <a:off x="8192994" y="3333731"/>
             <a:ext cx="2951957" cy="2730501"/>
           </a:xfrm>
           <a:custGeom>
@@ -15292,7 +15317,17 @@
             </a:lvl1pPr>
           </a:lstStyle>
           <a:p>
-            <a:r>
+            <a:endParaRPr lang="en-US" dirty="0"/>
+          </a:p>
+          <a:p>
+            <a:endParaRPr lang="en-US" dirty="0"/>
+          </a:p>
+          <a:p>
+            <a:endParaRPr lang="en-US" dirty="0"/>
+          </a:p>
+          <a:p>
+            <a:r>
+              <a:rPr dirty="0"/>
               <a:t>a list can contain a bunch of values of varying types</a:t>
             </a:r>
           </a:p>
@@ -15385,6 +15420,7 @@
               <a:buNone/>
             </a:pPr>
             <a:r>
+              <a:rPr dirty="0"/>
               <a:t>Definition (from Wikipedia):</a:t>
             </a:r>
           </a:p>
@@ -15394,17 +15430,19 @@
               <a:buNone/>
             </a:pPr>
             <a:r>
+              <a:rPr dirty="0"/>
               <a:t>a </a:t>
             </a:r>
             <a:r>
-              <a:rPr b="1"/>
+              <a:rPr b="1" dirty="0"/>
               <a:t>data structure</a:t>
             </a:r>
             <a:r>
+              <a:rPr dirty="0"/>
               <a:t> is a </a:t>
             </a:r>
             <a:r>
-              <a:rPr b="1">
+              <a:rPr b="1" dirty="0">
                 <a:solidFill>
                   <a:schemeClr val="accent4">
                     <a:hueOff val="-1081314"/>
@@ -15416,14 +15454,18 @@
               <a:t>collection of data values</a:t>
             </a:r>
             <a:r>
+              <a:rPr dirty="0"/>
               <a:t>,</a:t>
             </a:r>
-            <a:br/>
-            <a:r>
+            <a:br>
+              <a:rPr dirty="0"/>
+            </a:br>
+            <a:r>
+              <a:rPr dirty="0"/>
               <a:t>the </a:t>
             </a:r>
             <a:r>
-              <a:rPr b="1">
+              <a:rPr b="1" dirty="0">
                 <a:solidFill>
                   <a:schemeClr val="accent4">
                     <a:hueOff val="-1081314"/>
@@ -15435,14 +15477,18 @@
               <a:t>relationships</a:t>
             </a:r>
             <a:r>
+              <a:rPr dirty="0"/>
               <a:t> among them,</a:t>
             </a:r>
-            <a:br/>
-            <a:r>
+            <a:br>
+              <a:rPr dirty="0"/>
+            </a:br>
+            <a:r>
+              <a:rPr dirty="0"/>
               <a:t>and the functions or </a:t>
             </a:r>
             <a:r>
-              <a:rPr b="1">
+              <a:rPr b="1" dirty="0">
                 <a:solidFill>
                   <a:schemeClr val="accent4">
                     <a:hueOff val="-1081314"/>
@@ -15453,8 +15499,11 @@
               </a:rPr>
               <a:t>operations</a:t>
             </a:r>
-            <a:br/>
-            <a:r>
+            <a:br>
+              <a:rPr dirty="0"/>
+            </a:br>
+            <a:r>
+              <a:rPr dirty="0"/>
               <a:t>that can be applied to the data</a:t>
             </a:r>
           </a:p>
@@ -15572,7 +15621,17 @@
             </a:lvl1pPr>
           </a:lstStyle>
           <a:p>
-            <a:r>
+            <a:endParaRPr lang="en-US" dirty="0"/>
+          </a:p>
+          <a:p>
+            <a:endParaRPr lang="en-US" dirty="0"/>
+          </a:p>
+          <a:p>
+            <a:endParaRPr lang="en-US" dirty="0"/>
+          </a:p>
+          <a:p>
+            <a:r>
+              <a:rPr dirty="0"/>
               <a:t>a list can contain a bunch of values of varying types</a:t>
             </a:r>
           </a:p>
@@ -15690,7 +15749,20 @@
             </a:lvl1pPr>
           </a:lstStyle>
           <a:p>
-            <a:r>
+            <a:endParaRPr lang="en-US" dirty="0"/>
+          </a:p>
+          <a:p>
+            <a:endParaRPr lang="en-US" dirty="0"/>
+          </a:p>
+          <a:p>
+            <a:endParaRPr lang="en-US" dirty="0"/>
+          </a:p>
+          <a:p>
+            <a:endParaRPr lang="en-US" dirty="0"/>
+          </a:p>
+          <a:p>
+            <a:r>
+              <a:rPr dirty="0"/>
               <a:t>every value has an index, representing an order within the list</a:t>
             </a:r>
           </a:p>
@@ -15807,9 +15879,7 @@
                 <a:sym typeface="Gill Sans SemiBold"/>
               </a:defRPr>
             </a:pPr>
-            <a:r>
-              <a:t>L.sort(), len(L), L.pop(0), L.append(x),</a:t>
-            </a:r>
+            <a:endParaRPr lang="en-US" dirty="0"/>
           </a:p>
           <a:p>
             <a:pPr>
@@ -15820,9 +15890,112 @@
                 <a:sym typeface="Gill Sans SemiBold"/>
               </a:defRPr>
             </a:pPr>
-            <a:r>
-              <a:t>update, iterate (for loop), etc</a:t>
-            </a:r>
+            <a:endParaRPr lang="en-US" dirty="0"/>
+          </a:p>
+          <a:p>
+            <a:pPr>
+              <a:defRPr sz="2200" b="0">
+                <a:latin typeface="+mn-lt"/>
+                <a:ea typeface="+mn-ea"/>
+                <a:cs typeface="+mn-cs"/>
+                <a:sym typeface="Gill Sans SemiBold"/>
+              </a:defRPr>
+            </a:pPr>
+            <a:endParaRPr lang="en-US" dirty="0"/>
+          </a:p>
+          <a:p>
+            <a:pPr>
+              <a:defRPr sz="2200" b="0">
+                <a:latin typeface="+mn-lt"/>
+                <a:ea typeface="+mn-ea"/>
+                <a:cs typeface="+mn-cs"/>
+                <a:sym typeface="Gill Sans SemiBold"/>
+              </a:defRPr>
+            </a:pPr>
+            <a:endParaRPr lang="en-US" dirty="0"/>
+          </a:p>
+          <a:p>
+            <a:pPr>
+              <a:defRPr sz="2200" b="0">
+                <a:latin typeface="+mn-lt"/>
+                <a:ea typeface="+mn-ea"/>
+                <a:cs typeface="+mn-cs"/>
+                <a:sym typeface="Gill Sans SemiBold"/>
+              </a:defRPr>
+            </a:pPr>
+            <a:endParaRPr lang="en-US" dirty="0"/>
+          </a:p>
+          <a:p>
+            <a:pPr>
+              <a:defRPr sz="2200" b="0">
+                <a:latin typeface="+mn-lt"/>
+                <a:ea typeface="+mn-ea"/>
+                <a:cs typeface="+mn-cs"/>
+                <a:sym typeface="Gill Sans SemiBold"/>
+              </a:defRPr>
+            </a:pPr>
+            <a:endParaRPr lang="en-US" dirty="0"/>
+          </a:p>
+          <a:p>
+            <a:pPr>
+              <a:defRPr sz="2200" b="0">
+                <a:latin typeface="+mn-lt"/>
+                <a:ea typeface="+mn-ea"/>
+                <a:cs typeface="+mn-cs"/>
+                <a:sym typeface="Gill Sans SemiBold"/>
+              </a:defRPr>
+            </a:pPr>
+            <a:r>
+              <a:rPr dirty="0" err="1"/>
+              <a:t>L.sort</a:t>
+            </a:r>
+            <a:r>
+              <a:rPr dirty="0"/>
+              <a:t>(), </a:t>
+            </a:r>
+            <a:r>
+              <a:rPr dirty="0" err="1"/>
+              <a:t>len</a:t>
+            </a:r>
+            <a:r>
+              <a:rPr dirty="0"/>
+              <a:t>(L), </a:t>
+            </a:r>
+            <a:r>
+              <a:rPr dirty="0" err="1"/>
+              <a:t>L.pop</a:t>
+            </a:r>
+            <a:r>
+              <a:rPr dirty="0"/>
+              <a:t>(0), </a:t>
+            </a:r>
+            <a:r>
+              <a:rPr dirty="0" err="1"/>
+              <a:t>L.append</a:t>
+            </a:r>
+            <a:r>
+              <a:rPr dirty="0"/>
+              <a:t>(x),</a:t>
+            </a:r>
+          </a:p>
+          <a:p>
+            <a:pPr>
+              <a:defRPr sz="2200" b="0">
+                <a:latin typeface="+mn-lt"/>
+                <a:ea typeface="+mn-ea"/>
+                <a:cs typeface="+mn-cs"/>
+                <a:sym typeface="Gill Sans SemiBold"/>
+              </a:defRPr>
+            </a:pPr>
+            <a:r>
+              <a:rPr dirty="0"/>
+              <a:t>update, iterate (for loop), </a:t>
+            </a:r>
+            <a:r>
+              <a:rPr dirty="0" err="1"/>
+              <a:t>etc</a:t>
+            </a:r>
+            <a:endParaRPr dirty="0"/>
           </a:p>
         </p:txBody>
       </p:sp>

</xml_diff>

<commit_message>
Fixing reference to dict ordering lec18
</commit_message>
<xml_diff>
--- a/tyler/meena/cs220/s20/materials/lec_18_S20.pptx
+++ b/tyler/meena/cs220/s20/materials/lec_18_S20.pptx
@@ -342,6 +342,11 @@
       </a:defRPr>
     </a:lvl9pPr>
   </p:defaultTextStyle>
+  <p:extLst>
+    <p:ext uri="{EFAFB233-063F-42B5-8137-9DF3F51BA10A}">
+      <p15:sldGuideLst xmlns:p15="http://schemas.microsoft.com/office/powerpoint/2012/main"/>
+    </p:ext>
+  </p:extLst>
 </p:presentation>
 </file>
 
@@ -2160,7 +2165,7 @@
           </a:ln>
           <a:extLst>
             <a:ext uri="{C572A759-6A51-4108-AA02-DFA0A04FC94B}">
-              <ma14:wrappingTextBoxFlag xmlns:ma14="http://schemas.microsoft.com/office/mac/drawingml/2011/main" xmlns:a14="http://schemas.microsoft.com/office/drawing/2010/main" xmlns:m="http://schemas.openxmlformats.org/officeDocument/2006/math" xmlns="" val="1"/>
+              <ma14:wrappingTextBoxFlag xmlns="" xmlns:m="http://schemas.openxmlformats.org/officeDocument/2006/math" xmlns:a14="http://schemas.microsoft.com/office/drawing/2010/main" xmlns:ma14="http://schemas.microsoft.com/office/mac/drawingml/2011/main" val="1"/>
             </a:ext>
           </a:extLst>
         </p:spPr>
@@ -2199,7 +2204,7 @@
           </a:ln>
           <a:extLst>
             <a:ext uri="{C572A759-6A51-4108-AA02-DFA0A04FC94B}">
-              <ma14:wrappingTextBoxFlag xmlns:ma14="http://schemas.microsoft.com/office/mac/drawingml/2011/main" xmlns:a14="http://schemas.microsoft.com/office/drawing/2010/main" xmlns:m="http://schemas.openxmlformats.org/officeDocument/2006/math" xmlns="" val="1"/>
+              <ma14:wrappingTextBoxFlag xmlns="" xmlns:m="http://schemas.openxmlformats.org/officeDocument/2006/math" xmlns:a14="http://schemas.microsoft.com/office/drawing/2010/main" xmlns:ma14="http://schemas.microsoft.com/office/mac/drawingml/2011/main" val="1"/>
             </a:ext>
           </a:extLst>
         </p:spPr>
@@ -3729,7 +3734,7 @@
           </a:ln>
           <a:extLst>
             <a:ext uri="{C572A759-6A51-4108-AA02-DFA0A04FC94B}">
-              <ma14:wrappingTextBoxFlag xmlns:ma14="http://schemas.microsoft.com/office/mac/drawingml/2011/main" xmlns:a14="http://schemas.microsoft.com/office/drawing/2010/main" xmlns:m="http://schemas.openxmlformats.org/officeDocument/2006/math" xmlns="" val="1"/>
+              <ma14:wrappingTextBoxFlag xmlns="" xmlns:m="http://schemas.openxmlformats.org/officeDocument/2006/math" xmlns:a14="http://schemas.microsoft.com/office/drawing/2010/main" xmlns:ma14="http://schemas.microsoft.com/office/mac/drawingml/2011/main" val="1"/>
             </a:ext>
           </a:extLst>
         </p:spPr>
@@ -3927,7 +3932,7 @@
           </a:ln>
           <a:extLst>
             <a:ext uri="{C572A759-6A51-4108-AA02-DFA0A04FC94B}">
-              <ma14:wrappingTextBoxFlag xmlns:ma14="http://schemas.microsoft.com/office/mac/drawingml/2011/main" xmlns:a14="http://schemas.microsoft.com/office/drawing/2010/main" xmlns:m="http://schemas.openxmlformats.org/officeDocument/2006/math" xmlns="" val="1"/>
+              <ma14:wrappingTextBoxFlag xmlns="" xmlns:m="http://schemas.openxmlformats.org/officeDocument/2006/math" xmlns:a14="http://schemas.microsoft.com/office/drawing/2010/main" xmlns:ma14="http://schemas.microsoft.com/office/mac/drawingml/2011/main" val="1"/>
             </a:ext>
           </a:extLst>
         </p:spPr>
@@ -3974,7 +3979,7 @@
           </a:ln>
           <a:extLst>
             <a:ext uri="{C572A759-6A51-4108-AA02-DFA0A04FC94B}">
-              <ma14:wrappingTextBoxFlag xmlns:ma14="http://schemas.microsoft.com/office/mac/drawingml/2011/main" xmlns:a14="http://schemas.microsoft.com/office/drawing/2010/main" xmlns:m="http://schemas.openxmlformats.org/officeDocument/2006/math" xmlns="" val="1"/>
+              <ma14:wrappingTextBoxFlag xmlns="" xmlns:m="http://schemas.openxmlformats.org/officeDocument/2006/math" xmlns:a14="http://schemas.microsoft.com/office/drawing/2010/main" xmlns:ma14="http://schemas.microsoft.com/office/mac/drawingml/2011/main" val="1"/>
             </a:ext>
           </a:extLst>
         </p:spPr>
@@ -4021,7 +4026,7 @@
           </a:ln>
           <a:extLst>
             <a:ext uri="{C572A759-6A51-4108-AA02-DFA0A04FC94B}">
-              <ma14:wrappingTextBoxFlag xmlns:ma14="http://schemas.microsoft.com/office/mac/drawingml/2011/main" xmlns:a14="http://schemas.microsoft.com/office/drawing/2010/main" xmlns:m="http://schemas.openxmlformats.org/officeDocument/2006/math" xmlns="" val="1"/>
+              <ma14:wrappingTextBoxFlag xmlns="" xmlns:m="http://schemas.openxmlformats.org/officeDocument/2006/math" xmlns:a14="http://schemas.microsoft.com/office/drawing/2010/main" xmlns:ma14="http://schemas.microsoft.com/office/mac/drawingml/2011/main" val="1"/>
             </a:ext>
           </a:extLst>
         </p:spPr>
@@ -4068,7 +4073,7 @@
           </a:ln>
           <a:extLst>
             <a:ext uri="{C572A759-6A51-4108-AA02-DFA0A04FC94B}">
-              <ma14:wrappingTextBoxFlag xmlns:ma14="http://schemas.microsoft.com/office/mac/drawingml/2011/main" xmlns:a14="http://schemas.microsoft.com/office/drawing/2010/main" xmlns:m="http://schemas.openxmlformats.org/officeDocument/2006/math" xmlns="" val="1"/>
+              <ma14:wrappingTextBoxFlag xmlns="" xmlns:m="http://schemas.openxmlformats.org/officeDocument/2006/math" xmlns:a14="http://schemas.microsoft.com/office/drawing/2010/main" xmlns:ma14="http://schemas.microsoft.com/office/mac/drawingml/2011/main" val="1"/>
             </a:ext>
           </a:extLst>
         </p:spPr>
@@ -4178,7 +4183,7 @@
           </a:ln>
           <a:extLst>
             <a:ext uri="{C572A759-6A51-4108-AA02-DFA0A04FC94B}">
-              <ma14:wrappingTextBoxFlag xmlns:ma14="http://schemas.microsoft.com/office/mac/drawingml/2011/main" xmlns:a14="http://schemas.microsoft.com/office/drawing/2010/main" xmlns:m="http://schemas.openxmlformats.org/officeDocument/2006/math" xmlns="" val="1"/>
+              <ma14:wrappingTextBoxFlag xmlns="" xmlns:m="http://schemas.openxmlformats.org/officeDocument/2006/math" xmlns:a14="http://schemas.microsoft.com/office/drawing/2010/main" xmlns:ma14="http://schemas.microsoft.com/office/mac/drawingml/2011/main" val="1"/>
             </a:ext>
           </a:extLst>
         </p:spPr>
@@ -4466,7 +4471,7 @@
           </a:ln>
           <a:extLst>
             <a:ext uri="{C572A759-6A51-4108-AA02-DFA0A04FC94B}">
-              <ma14:wrappingTextBoxFlag xmlns:ma14="http://schemas.microsoft.com/office/mac/drawingml/2011/main" xmlns:a14="http://schemas.microsoft.com/office/drawing/2010/main" xmlns:m="http://schemas.openxmlformats.org/officeDocument/2006/math" xmlns="" val="1"/>
+              <ma14:wrappingTextBoxFlag xmlns="" xmlns:m="http://schemas.openxmlformats.org/officeDocument/2006/math" xmlns:a14="http://schemas.microsoft.com/office/drawing/2010/main" xmlns:ma14="http://schemas.microsoft.com/office/mac/drawingml/2011/main" val="1"/>
             </a:ext>
           </a:extLst>
         </p:spPr>
@@ -4801,7 +4806,7 @@
           </a:ln>
           <a:extLst>
             <a:ext uri="{C572A759-6A51-4108-AA02-DFA0A04FC94B}">
-              <ma14:wrappingTextBoxFlag xmlns:ma14="http://schemas.microsoft.com/office/mac/drawingml/2011/main" xmlns:a14="http://schemas.microsoft.com/office/drawing/2010/main" xmlns:m="http://schemas.openxmlformats.org/officeDocument/2006/math" xmlns="" val="1"/>
+              <ma14:wrappingTextBoxFlag xmlns="" xmlns:m="http://schemas.openxmlformats.org/officeDocument/2006/math" xmlns:a14="http://schemas.microsoft.com/office/drawing/2010/main" xmlns:ma14="http://schemas.microsoft.com/office/mac/drawingml/2011/main" val="1"/>
             </a:ext>
           </a:extLst>
         </p:spPr>
@@ -4874,7 +4879,7 @@
           </a:ln>
           <a:extLst>
             <a:ext uri="{C572A759-6A51-4108-AA02-DFA0A04FC94B}">
-              <ma14:wrappingTextBoxFlag xmlns:ma14="http://schemas.microsoft.com/office/mac/drawingml/2011/main" xmlns:a14="http://schemas.microsoft.com/office/drawing/2010/main" xmlns:m="http://schemas.openxmlformats.org/officeDocument/2006/math" xmlns="" val="1"/>
+              <ma14:wrappingTextBoxFlag xmlns="" xmlns:m="http://schemas.openxmlformats.org/officeDocument/2006/math" xmlns:a14="http://schemas.microsoft.com/office/drawing/2010/main" xmlns:ma14="http://schemas.microsoft.com/office/mac/drawingml/2011/main" val="1"/>
             </a:ext>
           </a:extLst>
         </p:spPr>
@@ -4940,7 +4945,7 @@
           </a:ln>
           <a:extLst>
             <a:ext uri="{C572A759-6A51-4108-AA02-DFA0A04FC94B}">
-              <ma14:wrappingTextBoxFlag xmlns:ma14="http://schemas.microsoft.com/office/mac/drawingml/2011/main" xmlns:a14="http://schemas.microsoft.com/office/drawing/2010/main" xmlns:m="http://schemas.openxmlformats.org/officeDocument/2006/math" xmlns="" val="1"/>
+              <ma14:wrappingTextBoxFlag xmlns="" xmlns:m="http://schemas.openxmlformats.org/officeDocument/2006/math" xmlns:a14="http://schemas.microsoft.com/office/drawing/2010/main" xmlns:ma14="http://schemas.microsoft.com/office/mac/drawingml/2011/main" val="1"/>
             </a:ext>
           </a:extLst>
         </p:spPr>
@@ -5213,7 +5218,7 @@
           </a:ln>
           <a:extLst>
             <a:ext uri="{C572A759-6A51-4108-AA02-DFA0A04FC94B}">
-              <ma14:wrappingTextBoxFlag xmlns:ma14="http://schemas.microsoft.com/office/mac/drawingml/2011/main" xmlns:a14="http://schemas.microsoft.com/office/drawing/2010/main" xmlns:m="http://schemas.openxmlformats.org/officeDocument/2006/math" xmlns="" val="1"/>
+              <ma14:wrappingTextBoxFlag xmlns="" xmlns:m="http://schemas.openxmlformats.org/officeDocument/2006/math" xmlns:a14="http://schemas.microsoft.com/office/drawing/2010/main" xmlns:ma14="http://schemas.microsoft.com/office/mac/drawingml/2011/main" val="1"/>
             </a:ext>
           </a:extLst>
         </p:spPr>
@@ -5381,7 +5386,7 @@
           </a:ln>
           <a:extLst>
             <a:ext uri="{C572A759-6A51-4108-AA02-DFA0A04FC94B}">
-              <ma14:wrappingTextBoxFlag xmlns:ma14="http://schemas.microsoft.com/office/mac/drawingml/2011/main" xmlns:a14="http://schemas.microsoft.com/office/drawing/2010/main" xmlns:m="http://schemas.openxmlformats.org/officeDocument/2006/math" xmlns="" val="1"/>
+              <ma14:wrappingTextBoxFlag xmlns="" xmlns:m="http://schemas.openxmlformats.org/officeDocument/2006/math" xmlns:a14="http://schemas.microsoft.com/office/drawing/2010/main" xmlns:ma14="http://schemas.microsoft.com/office/mac/drawingml/2011/main" val="1"/>
             </a:ext>
           </a:extLst>
         </p:spPr>
@@ -5428,7 +5433,7 @@
           </a:ln>
           <a:extLst>
             <a:ext uri="{C572A759-6A51-4108-AA02-DFA0A04FC94B}">
-              <ma14:wrappingTextBoxFlag xmlns:ma14="http://schemas.microsoft.com/office/mac/drawingml/2011/main" xmlns:a14="http://schemas.microsoft.com/office/drawing/2010/main" xmlns:m="http://schemas.openxmlformats.org/officeDocument/2006/math" xmlns="" val="1"/>
+              <ma14:wrappingTextBoxFlag xmlns="" xmlns:m="http://schemas.openxmlformats.org/officeDocument/2006/math" xmlns:a14="http://schemas.microsoft.com/office/drawing/2010/main" xmlns:ma14="http://schemas.microsoft.com/office/mac/drawingml/2011/main" val="1"/>
             </a:ext>
           </a:extLst>
         </p:spPr>
@@ -5596,7 +5601,7 @@
           </a:ln>
           <a:extLst>
             <a:ext uri="{C572A759-6A51-4108-AA02-DFA0A04FC94B}">
-              <ma14:wrappingTextBoxFlag xmlns:ma14="http://schemas.microsoft.com/office/mac/drawingml/2011/main" xmlns:a14="http://schemas.microsoft.com/office/drawing/2010/main" xmlns:m="http://schemas.openxmlformats.org/officeDocument/2006/math" xmlns="" val="1"/>
+              <ma14:wrappingTextBoxFlag xmlns="" xmlns:m="http://schemas.openxmlformats.org/officeDocument/2006/math" xmlns:a14="http://schemas.microsoft.com/office/drawing/2010/main" xmlns:ma14="http://schemas.microsoft.com/office/mac/drawingml/2011/main" val="1"/>
             </a:ext>
           </a:extLst>
         </p:spPr>
@@ -5661,7 +5666,7 @@
           </a:ln>
           <a:extLst>
             <a:ext uri="{C572A759-6A51-4108-AA02-DFA0A04FC94B}">
-              <ma14:wrappingTextBoxFlag xmlns:ma14="http://schemas.microsoft.com/office/mac/drawingml/2011/main" xmlns:a14="http://schemas.microsoft.com/office/drawing/2010/main" xmlns:m="http://schemas.openxmlformats.org/officeDocument/2006/math" xmlns="" val="1"/>
+              <ma14:wrappingTextBoxFlag xmlns="" xmlns:m="http://schemas.openxmlformats.org/officeDocument/2006/math" xmlns:a14="http://schemas.microsoft.com/office/drawing/2010/main" xmlns:ma14="http://schemas.microsoft.com/office/mac/drawingml/2011/main" val="1"/>
             </a:ext>
           </a:extLst>
         </p:spPr>
@@ -5873,7 +5878,7 @@
           </a:ln>
           <a:extLst>
             <a:ext uri="{C572A759-6A51-4108-AA02-DFA0A04FC94B}">
-              <ma14:wrappingTextBoxFlag xmlns:ma14="http://schemas.microsoft.com/office/mac/drawingml/2011/main" xmlns:a14="http://schemas.microsoft.com/office/drawing/2010/main" xmlns:m="http://schemas.openxmlformats.org/officeDocument/2006/math" xmlns="" val="1"/>
+              <ma14:wrappingTextBoxFlag xmlns="" xmlns:m="http://schemas.openxmlformats.org/officeDocument/2006/math" xmlns:a14="http://schemas.microsoft.com/office/drawing/2010/main" xmlns:ma14="http://schemas.microsoft.com/office/mac/drawingml/2011/main" val="1"/>
             </a:ext>
           </a:extLst>
         </p:spPr>
@@ -6090,7 +6095,7 @@
           </a:ln>
           <a:extLst>
             <a:ext uri="{C572A759-6A51-4108-AA02-DFA0A04FC94B}">
-              <ma14:wrappingTextBoxFlag xmlns:ma14="http://schemas.microsoft.com/office/mac/drawingml/2011/main" xmlns:a14="http://schemas.microsoft.com/office/drawing/2010/main" xmlns:m="http://schemas.openxmlformats.org/officeDocument/2006/math" xmlns="" val="1"/>
+              <ma14:wrappingTextBoxFlag xmlns="" xmlns:m="http://schemas.openxmlformats.org/officeDocument/2006/math" xmlns:a14="http://schemas.microsoft.com/office/drawing/2010/main" xmlns:ma14="http://schemas.microsoft.com/office/mac/drawingml/2011/main" val="1"/>
             </a:ext>
           </a:extLst>
         </p:spPr>
@@ -6267,7 +6272,7 @@
           </a:ln>
           <a:extLst>
             <a:ext uri="{C572A759-6A51-4108-AA02-DFA0A04FC94B}">
-              <ma14:wrappingTextBoxFlag xmlns:ma14="http://schemas.microsoft.com/office/mac/drawingml/2011/main" xmlns:a14="http://schemas.microsoft.com/office/drawing/2010/main" xmlns:m="http://schemas.openxmlformats.org/officeDocument/2006/math" xmlns="" val="1"/>
+              <ma14:wrappingTextBoxFlag xmlns="" xmlns:m="http://schemas.openxmlformats.org/officeDocument/2006/math" xmlns:a14="http://schemas.microsoft.com/office/drawing/2010/main" xmlns:ma14="http://schemas.microsoft.com/office/mac/drawingml/2011/main" val="1"/>
             </a:ext>
           </a:extLst>
         </p:spPr>
@@ -6483,7 +6488,7 @@
           </a:ln>
           <a:extLst>
             <a:ext uri="{C572A759-6A51-4108-AA02-DFA0A04FC94B}">
-              <ma14:wrappingTextBoxFlag xmlns:ma14="http://schemas.microsoft.com/office/mac/drawingml/2011/main" xmlns:a14="http://schemas.microsoft.com/office/drawing/2010/main" xmlns:m="http://schemas.openxmlformats.org/officeDocument/2006/math" xmlns="" val="1"/>
+              <ma14:wrappingTextBoxFlag xmlns="" xmlns:m="http://schemas.openxmlformats.org/officeDocument/2006/math" xmlns:a14="http://schemas.microsoft.com/office/drawing/2010/main" xmlns:ma14="http://schemas.microsoft.com/office/mac/drawingml/2011/main" val="1"/>
             </a:ext>
           </a:extLst>
         </p:spPr>
@@ -6814,7 +6819,7 @@
           </a:ln>
           <a:extLst>
             <a:ext uri="{C572A759-6A51-4108-AA02-DFA0A04FC94B}">
-              <ma14:wrappingTextBoxFlag xmlns:ma14="http://schemas.microsoft.com/office/mac/drawingml/2011/main" xmlns:a14="http://schemas.microsoft.com/office/drawing/2010/main" xmlns:m="http://schemas.openxmlformats.org/officeDocument/2006/math" xmlns="" val="1"/>
+              <ma14:wrappingTextBoxFlag xmlns="" xmlns:m="http://schemas.openxmlformats.org/officeDocument/2006/math" xmlns:a14="http://schemas.microsoft.com/office/drawing/2010/main" xmlns:ma14="http://schemas.microsoft.com/office/mac/drawingml/2011/main" val="1"/>
             </a:ext>
           </a:extLst>
         </p:spPr>
@@ -6871,7 +6876,7 @@
           </a:ln>
           <a:extLst>
             <a:ext uri="{C572A759-6A51-4108-AA02-DFA0A04FC94B}">
-              <ma14:wrappingTextBoxFlag xmlns:ma14="http://schemas.microsoft.com/office/mac/drawingml/2011/main" xmlns:a14="http://schemas.microsoft.com/office/drawing/2010/main" xmlns:m="http://schemas.openxmlformats.org/officeDocument/2006/math" xmlns="" val="1"/>
+              <ma14:wrappingTextBoxFlag xmlns="" xmlns:m="http://schemas.openxmlformats.org/officeDocument/2006/math" xmlns:a14="http://schemas.microsoft.com/office/drawing/2010/main" xmlns:ma14="http://schemas.microsoft.com/office/mac/drawingml/2011/main" val="1"/>
             </a:ext>
           </a:extLst>
         </p:spPr>
@@ -7174,7 +7179,7 @@
           </a:ln>
           <a:extLst>
             <a:ext uri="{C572A759-6A51-4108-AA02-DFA0A04FC94B}">
-              <ma14:wrappingTextBoxFlag xmlns:ma14="http://schemas.microsoft.com/office/mac/drawingml/2011/main" xmlns:a14="http://schemas.microsoft.com/office/drawing/2010/main" xmlns:m="http://schemas.openxmlformats.org/officeDocument/2006/math" xmlns="" val="1"/>
+              <ma14:wrappingTextBoxFlag xmlns="" xmlns:m="http://schemas.openxmlformats.org/officeDocument/2006/math" xmlns:a14="http://schemas.microsoft.com/office/drawing/2010/main" xmlns:ma14="http://schemas.microsoft.com/office/mac/drawingml/2011/main" val="1"/>
             </a:ext>
           </a:extLst>
         </p:spPr>
@@ -7361,7 +7366,7 @@
           </a:ln>
           <a:extLst>
             <a:ext uri="{C572A759-6A51-4108-AA02-DFA0A04FC94B}">
-              <ma14:wrappingTextBoxFlag xmlns:ma14="http://schemas.microsoft.com/office/mac/drawingml/2011/main" xmlns:a14="http://schemas.microsoft.com/office/drawing/2010/main" xmlns:m="http://schemas.openxmlformats.org/officeDocument/2006/math" xmlns="" val="1"/>
+              <ma14:wrappingTextBoxFlag xmlns="" xmlns:m="http://schemas.openxmlformats.org/officeDocument/2006/math" xmlns:a14="http://schemas.microsoft.com/office/drawing/2010/main" xmlns:ma14="http://schemas.microsoft.com/office/mac/drawingml/2011/main" val="1"/>
             </a:ext>
           </a:extLst>
         </p:spPr>
@@ -7493,7 +7498,7 @@
           </a:ln>
           <a:extLst>
             <a:ext uri="{C572A759-6A51-4108-AA02-DFA0A04FC94B}">
-              <ma14:wrappingTextBoxFlag xmlns:ma14="http://schemas.microsoft.com/office/mac/drawingml/2011/main" xmlns:a14="http://schemas.microsoft.com/office/drawing/2010/main" xmlns:m="http://schemas.openxmlformats.org/officeDocument/2006/math" xmlns="" val="1"/>
+              <ma14:wrappingTextBoxFlag xmlns="" xmlns:m="http://schemas.openxmlformats.org/officeDocument/2006/math" xmlns:a14="http://schemas.microsoft.com/office/drawing/2010/main" xmlns:ma14="http://schemas.microsoft.com/office/mac/drawingml/2011/main" val="1"/>
             </a:ext>
           </a:extLst>
         </p:spPr>
@@ -7540,7 +7545,7 @@
           </a:ln>
           <a:extLst>
             <a:ext uri="{C572A759-6A51-4108-AA02-DFA0A04FC94B}">
-              <ma14:wrappingTextBoxFlag xmlns:ma14="http://schemas.microsoft.com/office/mac/drawingml/2011/main" xmlns:a14="http://schemas.microsoft.com/office/drawing/2010/main" xmlns:m="http://schemas.openxmlformats.org/officeDocument/2006/math" xmlns="" val="1"/>
+              <ma14:wrappingTextBoxFlag xmlns="" xmlns:m="http://schemas.openxmlformats.org/officeDocument/2006/math" xmlns:a14="http://schemas.microsoft.com/office/drawing/2010/main" xmlns:ma14="http://schemas.microsoft.com/office/mac/drawingml/2011/main" val="1"/>
             </a:ext>
           </a:extLst>
         </p:spPr>
@@ -7587,7 +7592,7 @@
           </a:ln>
           <a:extLst>
             <a:ext uri="{C572A759-6A51-4108-AA02-DFA0A04FC94B}">
-              <ma14:wrappingTextBoxFlag xmlns:ma14="http://schemas.microsoft.com/office/mac/drawingml/2011/main" xmlns:a14="http://schemas.microsoft.com/office/drawing/2010/main" xmlns:m="http://schemas.openxmlformats.org/officeDocument/2006/math" xmlns="" val="1"/>
+              <ma14:wrappingTextBoxFlag xmlns="" xmlns:m="http://schemas.openxmlformats.org/officeDocument/2006/math" xmlns:a14="http://schemas.microsoft.com/office/drawing/2010/main" xmlns:ma14="http://schemas.microsoft.com/office/mac/drawingml/2011/main" val="1"/>
             </a:ext>
           </a:extLst>
         </p:spPr>
@@ -7634,7 +7639,7 @@
           </a:ln>
           <a:extLst>
             <a:ext uri="{C572A759-6A51-4108-AA02-DFA0A04FC94B}">
-              <ma14:wrappingTextBoxFlag xmlns:ma14="http://schemas.microsoft.com/office/mac/drawingml/2011/main" xmlns:a14="http://schemas.microsoft.com/office/drawing/2010/main" xmlns:m="http://schemas.openxmlformats.org/officeDocument/2006/math" xmlns="" val="1"/>
+              <ma14:wrappingTextBoxFlag xmlns="" xmlns:m="http://schemas.openxmlformats.org/officeDocument/2006/math" xmlns:a14="http://schemas.microsoft.com/office/drawing/2010/main" xmlns:ma14="http://schemas.microsoft.com/office/mac/drawingml/2011/main" val="1"/>
             </a:ext>
           </a:extLst>
         </p:spPr>
@@ -7696,7 +7701,7 @@
           </a:ln>
           <a:extLst>
             <a:ext uri="{C572A759-6A51-4108-AA02-DFA0A04FC94B}">
-              <ma14:wrappingTextBoxFlag xmlns:ma14="http://schemas.microsoft.com/office/mac/drawingml/2011/main" xmlns:a14="http://schemas.microsoft.com/office/drawing/2010/main" xmlns:m="http://schemas.openxmlformats.org/officeDocument/2006/math" xmlns="" val="1"/>
+              <ma14:wrappingTextBoxFlag xmlns="" xmlns:m="http://schemas.openxmlformats.org/officeDocument/2006/math" xmlns:a14="http://schemas.microsoft.com/office/drawing/2010/main" xmlns:ma14="http://schemas.microsoft.com/office/mac/drawingml/2011/main" val="1"/>
             </a:ext>
           </a:extLst>
         </p:spPr>
@@ -8047,7 +8052,7 @@
           </a:ln>
           <a:extLst>
             <a:ext uri="{C572A759-6A51-4108-AA02-DFA0A04FC94B}">
-              <ma14:wrappingTextBoxFlag xmlns:ma14="http://schemas.microsoft.com/office/mac/drawingml/2011/main" xmlns:a14="http://schemas.microsoft.com/office/drawing/2010/main" xmlns:m="http://schemas.openxmlformats.org/officeDocument/2006/math" xmlns="" val="1"/>
+              <ma14:wrappingTextBoxFlag xmlns="" xmlns:m="http://schemas.openxmlformats.org/officeDocument/2006/math" xmlns:a14="http://schemas.microsoft.com/office/drawing/2010/main" xmlns:ma14="http://schemas.microsoft.com/office/mac/drawingml/2011/main" val="1"/>
             </a:ext>
           </a:extLst>
         </p:spPr>
@@ -8260,7 +8265,7 @@
           </a:ln>
           <a:extLst>
             <a:ext uri="{C572A759-6A51-4108-AA02-DFA0A04FC94B}">
-              <ma14:wrappingTextBoxFlag xmlns:ma14="http://schemas.microsoft.com/office/mac/drawingml/2011/main" xmlns:a14="http://schemas.microsoft.com/office/drawing/2010/main" xmlns:m="http://schemas.openxmlformats.org/officeDocument/2006/math" xmlns="" val="1"/>
+              <ma14:wrappingTextBoxFlag xmlns="" xmlns:m="http://schemas.openxmlformats.org/officeDocument/2006/math" xmlns:a14="http://schemas.microsoft.com/office/drawing/2010/main" xmlns:ma14="http://schemas.microsoft.com/office/mac/drawingml/2011/main" val="1"/>
             </a:ext>
           </a:extLst>
         </p:spPr>
@@ -8542,7 +8547,7 @@
           </a:ln>
           <a:extLst>
             <a:ext uri="{C572A759-6A51-4108-AA02-DFA0A04FC94B}">
-              <ma14:wrappingTextBoxFlag xmlns:ma14="http://schemas.microsoft.com/office/mac/drawingml/2011/main" xmlns:a14="http://schemas.microsoft.com/office/drawing/2010/main" xmlns:m="http://schemas.openxmlformats.org/officeDocument/2006/math" xmlns="" val="1"/>
+              <ma14:wrappingTextBoxFlag xmlns="" xmlns:m="http://schemas.openxmlformats.org/officeDocument/2006/math" xmlns:a14="http://schemas.microsoft.com/office/drawing/2010/main" xmlns:ma14="http://schemas.microsoft.com/office/mac/drawingml/2011/main" val="1"/>
             </a:ext>
           </a:extLst>
         </p:spPr>
@@ -8755,7 +8760,7 @@
           </a:ln>
           <a:extLst>
             <a:ext uri="{C572A759-6A51-4108-AA02-DFA0A04FC94B}">
-              <ma14:wrappingTextBoxFlag xmlns:ma14="http://schemas.microsoft.com/office/mac/drawingml/2011/main" xmlns:a14="http://schemas.microsoft.com/office/drawing/2010/main" xmlns:m="http://schemas.openxmlformats.org/officeDocument/2006/math" xmlns="" val="1"/>
+              <ma14:wrappingTextBoxFlag xmlns="" xmlns:m="http://schemas.openxmlformats.org/officeDocument/2006/math" xmlns:a14="http://schemas.microsoft.com/office/drawing/2010/main" xmlns:ma14="http://schemas.microsoft.com/office/mac/drawingml/2011/main" val="1"/>
             </a:ext>
           </a:extLst>
         </p:spPr>
@@ -9037,7 +9042,7 @@
           </a:ln>
           <a:extLst>
             <a:ext uri="{C572A759-6A51-4108-AA02-DFA0A04FC94B}">
-              <ma14:wrappingTextBoxFlag xmlns:ma14="http://schemas.microsoft.com/office/mac/drawingml/2011/main" xmlns:a14="http://schemas.microsoft.com/office/drawing/2010/main" xmlns:m="http://schemas.openxmlformats.org/officeDocument/2006/math" xmlns="" val="1"/>
+              <ma14:wrappingTextBoxFlag xmlns="" xmlns:m="http://schemas.openxmlformats.org/officeDocument/2006/math" xmlns:a14="http://schemas.microsoft.com/office/drawing/2010/main" xmlns:ma14="http://schemas.microsoft.com/office/mac/drawingml/2011/main" val="1"/>
             </a:ext>
           </a:extLst>
         </p:spPr>
@@ -9250,7 +9255,7 @@
           </a:ln>
           <a:extLst>
             <a:ext uri="{C572A759-6A51-4108-AA02-DFA0A04FC94B}">
-              <ma14:wrappingTextBoxFlag xmlns:ma14="http://schemas.microsoft.com/office/mac/drawingml/2011/main" xmlns:a14="http://schemas.microsoft.com/office/drawing/2010/main" xmlns:m="http://schemas.openxmlformats.org/officeDocument/2006/math" xmlns="" val="1"/>
+              <ma14:wrappingTextBoxFlag xmlns="" xmlns:m="http://schemas.openxmlformats.org/officeDocument/2006/math" xmlns:a14="http://schemas.microsoft.com/office/drawing/2010/main" xmlns:ma14="http://schemas.microsoft.com/office/mac/drawingml/2011/main" val="1"/>
             </a:ext>
           </a:extLst>
         </p:spPr>
@@ -9482,10 +9487,14 @@
               <a:buNone/>
             </a:pPr>
             <a:r>
+              <a:rPr dirty="0"/>
               <a:t>Dictionaries map labels (called keys, rather than indexes)</a:t>
             </a:r>
-            <a:br/>
-            <a:r>
+            <a:br>
+              <a:rPr dirty="0"/>
+            </a:br>
+            <a:r>
+              <a:rPr dirty="0"/>
               <a:t>to values</a:t>
             </a:r>
           </a:p>
@@ -9497,6 +9506,7 @@
               <a:defRPr sz="2800"/>
             </a:pPr>
             <a:r>
+              <a:rPr dirty="0"/>
               <a:t>values can be anything we choose (as with lists)</a:t>
             </a:r>
           </a:p>
@@ -9508,6 +9518,7 @@
               <a:defRPr sz="2800"/>
             </a:pPr>
             <a:r>
+              <a:rPr dirty="0"/>
               <a:t>keys can be nearly anything we choose (must be immutable)</a:t>
             </a:r>
           </a:p>
@@ -9532,7 +9543,7 @@
           </a:ln>
           <a:extLst>
             <a:ext uri="{C572A759-6A51-4108-AA02-DFA0A04FC94B}">
-              <ma14:wrappingTextBoxFlag xmlns:ma14="http://schemas.microsoft.com/office/mac/drawingml/2011/main" xmlns:a14="http://schemas.microsoft.com/office/drawing/2010/main" xmlns:m="http://schemas.openxmlformats.org/officeDocument/2006/math" xmlns="" val="1"/>
+              <ma14:wrappingTextBoxFlag xmlns="" xmlns:m="http://schemas.openxmlformats.org/officeDocument/2006/math" xmlns:a14="http://schemas.microsoft.com/office/drawing/2010/main" xmlns:ma14="http://schemas.microsoft.com/office/mac/drawingml/2011/main" val="1"/>
             </a:ext>
           </a:extLst>
         </p:spPr>
@@ -9554,18 +9565,70 @@
               </a:defRPr>
             </a:pPr>
             <a:r>
-              <a:t>nums_list = [900, 700, 800]</a:t>
-            </a:r>
-            <a:br/>
-            <a:br/>
-            <a:r>
-              <a:rPr>
+              <a:rPr dirty="0" err="1">
+                <a:solidFill>
+                  <a:schemeClr val="bg2">
+                    <a:lumMod val="90000"/>
+                  </a:schemeClr>
+                </a:solidFill>
+              </a:rPr>
+              <a:t>nums_list</a:t>
+            </a:r>
+            <a:r>
+              <a:rPr dirty="0">
+                <a:solidFill>
+                  <a:schemeClr val="bg2">
+                    <a:lumMod val="90000"/>
+                  </a:schemeClr>
+                </a:solidFill>
+              </a:rPr>
+              <a:t> = [900, 700, 800]</a:t>
+            </a:r>
+            <a:br>
+              <a:rPr dirty="0">
+                <a:solidFill>
+                  <a:schemeClr val="bg2">
+                    <a:lumMod val="90000"/>
+                  </a:schemeClr>
+                </a:solidFill>
+              </a:rPr>
+            </a:br>
+            <a:br>
+              <a:rPr dirty="0">
+                <a:solidFill>
+                  <a:schemeClr val="bg2">
+                    <a:lumMod val="90000"/>
+                  </a:schemeClr>
+                </a:solidFill>
+              </a:rPr>
+            </a:br>
+            <a:r>
+              <a:rPr dirty="0" err="1">
+                <a:solidFill>
+                  <a:schemeClr val="bg2">
+                    <a:lumMod val="90000"/>
+                  </a:schemeClr>
+                </a:solidFill>
                 <a:latin typeface="Gill Sans"/>
                 <a:ea typeface="Gill Sans"/>
                 <a:cs typeface="Gill Sans"/>
                 <a:sym typeface="Gill Sans"/>
               </a:rPr>
-              <a:t>nums_list[1]       700</a:t>
+              <a:t>nums_list</a:t>
+            </a:r>
+            <a:r>
+              <a:rPr dirty="0">
+                <a:solidFill>
+                  <a:schemeClr val="bg2">
+                    <a:lumMod val="90000"/>
+                  </a:schemeClr>
+                </a:solidFill>
+                <a:latin typeface="Gill Sans"/>
+                <a:ea typeface="Gill Sans"/>
+                <a:cs typeface="Gill Sans"/>
+                <a:sym typeface="Gill Sans"/>
+              </a:rPr>
+              <a:t>[1]       700</a:t>
             </a:r>
           </a:p>
           <a:p>
@@ -9581,61 +9644,51 @@
               </a:defRPr>
             </a:pPr>
             <a:r>
-              <a:t>nums_dict = {</a:t>
-            </a:r>
-            <a:r>
-              <a:rPr>
-                <a:solidFill>
-                  <a:schemeClr val="accent5">
-                    <a:hueOff val="-82419"/>
-                    <a:satOff val="-9513"/>
-                    <a:lumOff val="-16343"/>
+              <a:rPr dirty="0" err="1">
+                <a:solidFill>
+                  <a:schemeClr val="bg2">
+                    <a:lumMod val="90000"/>
                   </a:schemeClr>
                 </a:solidFill>
               </a:rPr>
-              <a:t>“first”:</a:t>
-            </a:r>
-            <a:r>
-              <a:t>900, </a:t>
-            </a:r>
-            <a:r>
-              <a:rPr>
-                <a:solidFill>
-                  <a:schemeClr val="accent5">
-                    <a:hueOff val="-82419"/>
-                    <a:satOff val="-9513"/>
-                    <a:lumOff val="-16343"/>
+              <a:t>nums_dict</a:t>
+            </a:r>
+            <a:r>
+              <a:rPr dirty="0">
+                <a:solidFill>
+                  <a:schemeClr val="bg2">
+                    <a:lumMod val="90000"/>
                   </a:schemeClr>
                 </a:solidFill>
               </a:rPr>
-              <a:t>“second”:</a:t>
-            </a:r>
-            <a:r>
-              <a:t>700, </a:t>
-            </a:r>
-            <a:r>
-              <a:rPr b="1">
-                <a:solidFill>
-                  <a:schemeClr val="accent5">
-                    <a:hueOff val="-82419"/>
-                    <a:satOff val="-9513"/>
-                    <a:lumOff val="-16343"/>
+              <a:t> = {“first”:900, “second”:700, </a:t>
+            </a:r>
+            <a:r>
+              <a:rPr b="1" dirty="0">
+                <a:solidFill>
+                  <a:schemeClr val="bg2">
+                    <a:lumMod val="90000"/>
                   </a:schemeClr>
                 </a:solidFill>
               </a:rPr>
-              <a:t>“third”:</a:t>
-            </a:r>
-            <a:r>
-              <a:rPr b="1"/>
-              <a:t>800</a:t>
-            </a:r>
-            <a:r>
+              <a:t>“third”:800</a:t>
+            </a:r>
+            <a:r>
+              <a:rPr dirty="0">
+                <a:solidFill>
+                  <a:schemeClr val="bg2">
+                    <a:lumMod val="90000"/>
+                  </a:schemeClr>
+                </a:solidFill>
+              </a:rPr>
               <a:t>}</a:t>
             </a:r>
-            <a:endParaRPr>
-              <a:latin typeface="Gill Sans"/>
-              <a:ea typeface="Gill Sans"/>
-              <a:cs typeface="Gill Sans"/>
+            <a:endParaRPr dirty="0">
+              <a:solidFill>
+                <a:schemeClr val="bg2">
+                  <a:lumMod val="90000"/>
+                </a:schemeClr>
+              </a:solidFill>
               <a:sym typeface="Gill Sans"/>
             </a:endParaRPr>
           </a:p>
@@ -9652,13 +9705,32 @@
               </a:defRPr>
             </a:pPr>
             <a:r>
-              <a:rPr>
+              <a:rPr dirty="0" err="1">
+                <a:solidFill>
+                  <a:schemeClr val="bg2">
+                    <a:lumMod val="90000"/>
+                  </a:schemeClr>
+                </a:solidFill>
                 <a:latin typeface="Gill Sans"/>
                 <a:ea typeface="Gill Sans"/>
                 <a:cs typeface="Gill Sans"/>
                 <a:sym typeface="Gill Sans"/>
               </a:rPr>
-              <a:t>nums_dict[“third”]       800</a:t>
+              <a:t>nums_dict</a:t>
+            </a:r>
+            <a:r>
+              <a:rPr dirty="0">
+                <a:solidFill>
+                  <a:schemeClr val="bg2">
+                    <a:lumMod val="90000"/>
+                  </a:schemeClr>
+                </a:solidFill>
+                <a:latin typeface="Gill Sans"/>
+                <a:ea typeface="Gill Sans"/>
+                <a:cs typeface="Gill Sans"/>
+                <a:sym typeface="Gill Sans"/>
+              </a:rPr>
+              <a:t>[“third”]       800</a:t>
             </a:r>
           </a:p>
         </p:txBody>
@@ -9688,7 +9760,7 @@
           </a:ln>
           <a:extLst>
             <a:ext uri="{C572A759-6A51-4108-AA02-DFA0A04FC94B}">
-              <ma14:wrappingTextBoxFlag xmlns:ma14="http://schemas.microsoft.com/office/mac/drawingml/2011/main" xmlns:a14="http://schemas.microsoft.com/office/drawing/2010/main" xmlns:m="http://schemas.openxmlformats.org/officeDocument/2006/math" xmlns="" val="1"/>
+              <ma14:wrappingTextBoxFlag xmlns="" xmlns:m="http://schemas.openxmlformats.org/officeDocument/2006/math" xmlns:a14="http://schemas.microsoft.com/office/drawing/2010/main" xmlns:ma14="http://schemas.microsoft.com/office/mac/drawingml/2011/main" val="1"/>
             </a:ext>
           </a:extLst>
         </p:spPr>
@@ -9736,7 +9808,7 @@
           </a:ln>
           <a:extLst>
             <a:ext uri="{C572A759-6A51-4108-AA02-DFA0A04FC94B}">
-              <ma14:wrappingTextBoxFlag xmlns:ma14="http://schemas.microsoft.com/office/mac/drawingml/2011/main" xmlns:a14="http://schemas.microsoft.com/office/drawing/2010/main" xmlns:m="http://schemas.openxmlformats.org/officeDocument/2006/math" xmlns="" val="1"/>
+              <ma14:wrappingTextBoxFlag xmlns="" xmlns:m="http://schemas.openxmlformats.org/officeDocument/2006/math" xmlns:a14="http://schemas.microsoft.com/office/drawing/2010/main" xmlns:ma14="http://schemas.microsoft.com/office/mac/drawingml/2011/main" val="1"/>
             </a:ext>
           </a:extLst>
         </p:spPr>
@@ -9784,7 +9856,7 @@
           </a:ln>
           <a:extLst>
             <a:ext uri="{C572A759-6A51-4108-AA02-DFA0A04FC94B}">
-              <ma14:wrappingTextBoxFlag xmlns:ma14="http://schemas.microsoft.com/office/mac/drawingml/2011/main" xmlns:a14="http://schemas.microsoft.com/office/drawing/2010/main" xmlns:m="http://schemas.openxmlformats.org/officeDocument/2006/math" xmlns="" val="1"/>
+              <ma14:wrappingTextBoxFlag xmlns="" xmlns:m="http://schemas.openxmlformats.org/officeDocument/2006/math" xmlns:a14="http://schemas.microsoft.com/office/drawing/2010/main" xmlns:ma14="http://schemas.microsoft.com/office/mac/drawingml/2011/main" val="1"/>
             </a:ext>
           </a:extLst>
         </p:spPr>
@@ -9832,7 +9904,7 @@
           </a:ln>
           <a:extLst>
             <a:ext uri="{C572A759-6A51-4108-AA02-DFA0A04FC94B}">
-              <ma14:wrappingTextBoxFlag xmlns:ma14="http://schemas.microsoft.com/office/mac/drawingml/2011/main" xmlns:a14="http://schemas.microsoft.com/office/drawing/2010/main" xmlns:m="http://schemas.openxmlformats.org/officeDocument/2006/math" xmlns="" val="1"/>
+              <ma14:wrappingTextBoxFlag xmlns="" xmlns:m="http://schemas.openxmlformats.org/officeDocument/2006/math" xmlns:a14="http://schemas.microsoft.com/office/drawing/2010/main" xmlns:ma14="http://schemas.microsoft.com/office/mac/drawingml/2011/main" val="1"/>
             </a:ext>
           </a:extLst>
         </p:spPr>
@@ -9880,7 +9952,7 @@
           </a:ln>
           <a:extLst>
             <a:ext uri="{C572A759-6A51-4108-AA02-DFA0A04FC94B}">
-              <ma14:wrappingTextBoxFlag xmlns:ma14="http://schemas.microsoft.com/office/mac/drawingml/2011/main" xmlns:a14="http://schemas.microsoft.com/office/drawing/2010/main" xmlns:m="http://schemas.openxmlformats.org/officeDocument/2006/math" xmlns="" val="1"/>
+              <ma14:wrappingTextBoxFlag xmlns="" xmlns:m="http://schemas.openxmlformats.org/officeDocument/2006/math" xmlns:a14="http://schemas.microsoft.com/office/drawing/2010/main" xmlns:ma14="http://schemas.microsoft.com/office/mac/drawingml/2011/main" val="1"/>
             </a:ext>
           </a:extLst>
         </p:spPr>
@@ -9928,7 +10000,7 @@
           </a:ln>
           <a:extLst>
             <a:ext uri="{C572A759-6A51-4108-AA02-DFA0A04FC94B}">
-              <ma14:wrappingTextBoxFlag xmlns:ma14="http://schemas.microsoft.com/office/mac/drawingml/2011/main" xmlns:a14="http://schemas.microsoft.com/office/drawing/2010/main" xmlns:m="http://schemas.openxmlformats.org/officeDocument/2006/math" xmlns="" val="1"/>
+              <ma14:wrappingTextBoxFlag xmlns="" xmlns:m="http://schemas.openxmlformats.org/officeDocument/2006/math" xmlns:a14="http://schemas.microsoft.com/office/drawing/2010/main" xmlns:ma14="http://schemas.microsoft.com/office/mac/drawingml/2011/main" val="1"/>
             </a:ext>
           </a:extLst>
         </p:spPr>
@@ -9970,7 +10042,7 @@
           </a:ln>
           <a:extLst>
             <a:ext uri="{C572A759-6A51-4108-AA02-DFA0A04FC94B}">
-              <ma14:wrappingTextBoxFlag xmlns:ma14="http://schemas.microsoft.com/office/mac/drawingml/2011/main" xmlns:a14="http://schemas.microsoft.com/office/drawing/2010/main" xmlns:m="http://schemas.openxmlformats.org/officeDocument/2006/math" xmlns="" val="1"/>
+              <ma14:wrappingTextBoxFlag xmlns="" xmlns:m="http://schemas.openxmlformats.org/officeDocument/2006/math" xmlns:a14="http://schemas.microsoft.com/office/drawing/2010/main" xmlns:ma14="http://schemas.microsoft.com/office/mac/drawingml/2011/main" val="1"/>
             </a:ext>
           </a:extLst>
         </p:spPr>
@@ -10017,7 +10089,7 @@
           </a:ln>
           <a:extLst>
             <a:ext uri="{C572A759-6A51-4108-AA02-DFA0A04FC94B}">
-              <ma14:wrappingTextBoxFlag xmlns:ma14="http://schemas.microsoft.com/office/mac/drawingml/2011/main" xmlns:a14="http://schemas.microsoft.com/office/drawing/2010/main" xmlns:m="http://schemas.openxmlformats.org/officeDocument/2006/math" xmlns="" val="1"/>
+              <ma14:wrappingTextBoxFlag xmlns="" xmlns:m="http://schemas.openxmlformats.org/officeDocument/2006/math" xmlns:a14="http://schemas.microsoft.com/office/drawing/2010/main" xmlns:ma14="http://schemas.microsoft.com/office/mac/drawingml/2011/main" val="1"/>
             </a:ext>
           </a:extLst>
         </p:spPr>
@@ -10064,7 +10136,7 @@
           </a:ln>
           <a:extLst>
             <a:ext uri="{C572A759-6A51-4108-AA02-DFA0A04FC94B}">
-              <ma14:wrappingTextBoxFlag xmlns:ma14="http://schemas.microsoft.com/office/mac/drawingml/2011/main" xmlns:a14="http://schemas.microsoft.com/office/drawing/2010/main" xmlns:m="http://schemas.openxmlformats.org/officeDocument/2006/math" xmlns="" val="1"/>
+              <ma14:wrappingTextBoxFlag xmlns="" xmlns:m="http://schemas.openxmlformats.org/officeDocument/2006/math" xmlns:a14="http://schemas.microsoft.com/office/drawing/2010/main" xmlns:ma14="http://schemas.microsoft.com/office/mac/drawingml/2011/main" val="1"/>
             </a:ext>
           </a:extLst>
         </p:spPr>
@@ -10111,7 +10183,7 @@
           </a:ln>
           <a:extLst>
             <a:ext uri="{C572A759-6A51-4108-AA02-DFA0A04FC94B}">
-              <ma14:wrappingTextBoxFlag xmlns:ma14="http://schemas.microsoft.com/office/mac/drawingml/2011/main" xmlns:a14="http://schemas.microsoft.com/office/drawing/2010/main" xmlns:m="http://schemas.openxmlformats.org/officeDocument/2006/math" xmlns="" val="1"/>
+              <ma14:wrappingTextBoxFlag xmlns="" xmlns:m="http://schemas.openxmlformats.org/officeDocument/2006/math" xmlns:a14="http://schemas.microsoft.com/office/drawing/2010/main" xmlns:ma14="http://schemas.microsoft.com/office/mac/drawingml/2011/main" val="1"/>
             </a:ext>
           </a:extLst>
         </p:spPr>
@@ -10158,7 +10230,7 @@
           </a:ln>
           <a:extLst>
             <a:ext uri="{C572A759-6A51-4108-AA02-DFA0A04FC94B}">
-              <ma14:wrappingTextBoxFlag xmlns:ma14="http://schemas.microsoft.com/office/mac/drawingml/2011/main" xmlns:a14="http://schemas.microsoft.com/office/drawing/2010/main" xmlns:m="http://schemas.openxmlformats.org/officeDocument/2006/math" xmlns="" val="1"/>
+              <ma14:wrappingTextBoxFlag xmlns="" xmlns:m="http://schemas.openxmlformats.org/officeDocument/2006/math" xmlns:a14="http://schemas.microsoft.com/office/drawing/2010/main" xmlns:ma14="http://schemas.microsoft.com/office/mac/drawingml/2011/main" val="1"/>
             </a:ext>
           </a:extLst>
         </p:spPr>
@@ -10205,7 +10277,7 @@
           </a:ln>
           <a:extLst>
             <a:ext uri="{C572A759-6A51-4108-AA02-DFA0A04FC94B}">
-              <ma14:wrappingTextBoxFlag xmlns:ma14="http://schemas.microsoft.com/office/mac/drawingml/2011/main" xmlns:a14="http://schemas.microsoft.com/office/drawing/2010/main" xmlns:m="http://schemas.openxmlformats.org/officeDocument/2006/math" xmlns="" val="1"/>
+              <ma14:wrappingTextBoxFlag xmlns="" xmlns:m="http://schemas.openxmlformats.org/officeDocument/2006/math" xmlns:a14="http://schemas.microsoft.com/office/drawing/2010/main" xmlns:ma14="http://schemas.microsoft.com/office/mac/drawingml/2011/main" val="1"/>
             </a:ext>
           </a:extLst>
         </p:spPr>
@@ -10293,7 +10365,7 @@
           </a:ln>
           <a:extLst>
             <a:ext uri="{C572A759-6A51-4108-AA02-DFA0A04FC94B}">
-              <ma14:wrappingTextBoxFlag xmlns:ma14="http://schemas.microsoft.com/office/mac/drawingml/2011/main" xmlns:a14="http://schemas.microsoft.com/office/drawing/2010/main" xmlns:m="http://schemas.openxmlformats.org/officeDocument/2006/math" xmlns="" val="1"/>
+              <ma14:wrappingTextBoxFlag xmlns="" xmlns:m="http://schemas.openxmlformats.org/officeDocument/2006/math" xmlns:a14="http://schemas.microsoft.com/office/drawing/2010/main" xmlns:ma14="http://schemas.microsoft.com/office/mac/drawingml/2011/main" val="1"/>
             </a:ext>
           </a:extLst>
         </p:spPr>
@@ -10367,8 +10439,8 @@
         </p:nvSpPr>
         <p:spPr>
           <a:xfrm rot="5400000">
-            <a:off x="11584664" y="8279169"/>
-            <a:ext cx="1040632" cy="393701"/>
+            <a:off x="11397617" y="8102591"/>
+            <a:ext cx="1870499" cy="718145"/>
           </a:xfrm>
           <a:prstGeom prst="rect">
             <a:avLst/>
@@ -10378,7 +10450,61 @@
           </a:ln>
           <a:extLst>
             <a:ext uri="{C572A759-6A51-4108-AA02-DFA0A04FC94B}">
-              <ma14:wrappingTextBoxFlag xmlns:ma14="http://schemas.microsoft.com/office/mac/drawingml/2011/main" xmlns:a14="http://schemas.microsoft.com/office/drawing/2010/main" xmlns:m="http://schemas.openxmlformats.org/officeDocument/2006/math" xmlns="" val="1"/>
+              <ma14:wrappingTextBoxFlag xmlns="" xmlns:m="http://schemas.openxmlformats.org/officeDocument/2006/math" xmlns:a14="http://schemas.microsoft.com/office/drawing/2010/main" xmlns:ma14="http://schemas.microsoft.com/office/mac/drawingml/2011/main" val="1"/>
+            </a:ext>
+          </a:extLst>
+        </p:spPr>
+        <p:txBody>
+          <a:bodyPr wrap="square" lIns="50800" tIns="50800" rIns="50800" bIns="50800" anchor="ctr">
+            <a:spAutoFit/>
+          </a:bodyPr>
+          <a:lstStyle>
+            <a:lvl1pPr algn="r">
+              <a:defRPr sz="2000" b="0">
+                <a:solidFill>
+                  <a:srgbClr val="929292"/>
+                </a:solidFill>
+              </a:defRPr>
+            </a:lvl1pPr>
+          </a:lstStyle>
+          <a:p>
+            <a:pPr algn="ctr"/>
+            <a:r>
+              <a:rPr dirty="0"/>
+              <a:t>no order</a:t>
+            </a:r>
+            <a:endParaRPr lang="en-US" dirty="0"/>
+          </a:p>
+          <a:p>
+            <a:pPr algn="ctr"/>
+            <a:r>
+              <a:rPr lang="en-US" dirty="0"/>
+              <a:t>(Python &lt;= 3.6)</a:t>
+            </a:r>
+            <a:endParaRPr dirty="0"/>
+          </a:p>
+        </p:txBody>
+      </p:sp>
+      <p:sp>
+        <p:nvSpPr>
+          <p:cNvPr id="300" name="labels"/>
+          <p:cNvSpPr txBox="1"/>
+          <p:nvPr/>
+        </p:nvSpPr>
+        <p:spPr>
+          <a:xfrm>
+            <a:off x="9768153" y="3864049"/>
+            <a:ext cx="680468" cy="393701"/>
+          </a:xfrm>
+          <a:prstGeom prst="rect">
+            <a:avLst/>
+          </a:prstGeom>
+          <a:ln w="12700">
+            <a:miter lim="400000"/>
+          </a:ln>
+          <a:extLst>
+            <a:ext uri="{C572A759-6A51-4108-AA02-DFA0A04FC94B}">
+              <ma14:wrappingTextBoxFlag xmlns="" xmlns:m="http://schemas.openxmlformats.org/officeDocument/2006/math" xmlns:a14="http://schemas.microsoft.com/office/drawing/2010/main" xmlns:ma14="http://schemas.microsoft.com/office/mac/drawingml/2011/main" val="1"/>
             </a:ext>
           </a:extLst>
         </p:spPr>
@@ -10397,21 +10523,21 @@
           </a:lstStyle>
           <a:p>
             <a:r>
-              <a:t>no order</a:t>
-            </a:r>
-          </a:p>
-        </p:txBody>
-      </p:sp>
-      <p:sp>
-        <p:nvSpPr>
-          <p:cNvPr id="300" name="labels"/>
+              <a:t>labels</a:t>
+            </a:r>
+          </a:p>
+        </p:txBody>
+      </p:sp>
+      <p:sp>
+        <p:nvSpPr>
+          <p:cNvPr id="301" name="values"/>
           <p:cNvSpPr txBox="1"/>
           <p:nvPr/>
         </p:nvSpPr>
         <p:spPr>
           <a:xfrm>
-            <a:off x="9768153" y="3864049"/>
-            <a:ext cx="680468" cy="393701"/>
+            <a:off x="10465854" y="3864049"/>
+            <a:ext cx="921073" cy="393701"/>
           </a:xfrm>
           <a:prstGeom prst="rect">
             <a:avLst/>
@@ -10421,50 +10547,7 @@
           </a:ln>
           <a:extLst>
             <a:ext uri="{C572A759-6A51-4108-AA02-DFA0A04FC94B}">
-              <ma14:wrappingTextBoxFlag xmlns:ma14="http://schemas.microsoft.com/office/mac/drawingml/2011/main" xmlns:a14="http://schemas.microsoft.com/office/drawing/2010/main" xmlns:m="http://schemas.openxmlformats.org/officeDocument/2006/math" xmlns="" val="1"/>
-            </a:ext>
-          </a:extLst>
-        </p:spPr>
-        <p:txBody>
-          <a:bodyPr wrap="none" lIns="50800" tIns="50800" rIns="50800" bIns="50800" anchor="ctr">
-            <a:spAutoFit/>
-          </a:bodyPr>
-          <a:lstStyle>
-            <a:lvl1pPr algn="r">
-              <a:defRPr sz="2000" b="0">
-                <a:solidFill>
-                  <a:srgbClr val="929292"/>
-                </a:solidFill>
-              </a:defRPr>
-            </a:lvl1pPr>
-          </a:lstStyle>
-          <a:p>
-            <a:r>
-              <a:t>labels</a:t>
-            </a:r>
-          </a:p>
-        </p:txBody>
-      </p:sp>
-      <p:sp>
-        <p:nvSpPr>
-          <p:cNvPr id="301" name="values"/>
-          <p:cNvSpPr txBox="1"/>
-          <p:nvPr/>
-        </p:nvSpPr>
-        <p:spPr>
-          <a:xfrm>
-            <a:off x="10465854" y="3864049"/>
-            <a:ext cx="921073" cy="393701"/>
-          </a:xfrm>
-          <a:prstGeom prst="rect">
-            <a:avLst/>
-          </a:prstGeom>
-          <a:ln w="12700">
-            <a:miter lim="400000"/>
-          </a:ln>
-          <a:extLst>
-            <a:ext uri="{C572A759-6A51-4108-AA02-DFA0A04FC94B}">
-              <ma14:wrappingTextBoxFlag xmlns:ma14="http://schemas.microsoft.com/office/mac/drawingml/2011/main" xmlns:a14="http://schemas.microsoft.com/office/drawing/2010/main" xmlns:m="http://schemas.openxmlformats.org/officeDocument/2006/math" xmlns="" val="1"/>
+              <ma14:wrappingTextBoxFlag xmlns="" xmlns:m="http://schemas.openxmlformats.org/officeDocument/2006/math" xmlns:a14="http://schemas.microsoft.com/office/drawing/2010/main" xmlns:ma14="http://schemas.microsoft.com/office/mac/drawingml/2011/main" val="1"/>
             </a:ext>
           </a:extLst>
         </p:spPr>
@@ -10507,7 +10590,7 @@
           </a:ln>
           <a:extLst>
             <a:ext uri="{C572A759-6A51-4108-AA02-DFA0A04FC94B}">
-              <ma14:wrappingTextBoxFlag xmlns:ma14="http://schemas.microsoft.com/office/mac/drawingml/2011/main" xmlns:a14="http://schemas.microsoft.com/office/drawing/2010/main" xmlns:m="http://schemas.openxmlformats.org/officeDocument/2006/math" xmlns="" val="1"/>
+              <ma14:wrappingTextBoxFlag xmlns="" xmlns:m="http://schemas.openxmlformats.org/officeDocument/2006/math" xmlns:a14="http://schemas.microsoft.com/office/drawing/2010/main" xmlns:ma14="http://schemas.microsoft.com/office/mac/drawingml/2011/main" val="1"/>
             </a:ext>
           </a:extLst>
         </p:spPr>
@@ -10550,7 +10633,7 @@
           </a:ln>
           <a:extLst>
             <a:ext uri="{C572A759-6A51-4108-AA02-DFA0A04FC94B}">
-              <ma14:wrappingTextBoxFlag xmlns:ma14="http://schemas.microsoft.com/office/mac/drawingml/2011/main" xmlns:a14="http://schemas.microsoft.com/office/drawing/2010/main" xmlns:m="http://schemas.openxmlformats.org/officeDocument/2006/math" xmlns="" val="1"/>
+              <ma14:wrappingTextBoxFlag xmlns="" xmlns:m="http://schemas.openxmlformats.org/officeDocument/2006/math" xmlns:a14="http://schemas.microsoft.com/office/drawing/2010/main" xmlns:ma14="http://schemas.microsoft.com/office/mac/drawingml/2011/main" val="1"/>
             </a:ext>
           </a:extLst>
         </p:spPr>
@@ -10593,7 +10676,7 @@
           </a:ln>
           <a:extLst>
             <a:ext uri="{C572A759-6A51-4108-AA02-DFA0A04FC94B}">
-              <ma14:wrappingTextBoxFlag xmlns:ma14="http://schemas.microsoft.com/office/mac/drawingml/2011/main" xmlns:a14="http://schemas.microsoft.com/office/drawing/2010/main" xmlns:m="http://schemas.openxmlformats.org/officeDocument/2006/math" xmlns="" val="1"/>
+              <ma14:wrappingTextBoxFlag xmlns="" xmlns:m="http://schemas.openxmlformats.org/officeDocument/2006/math" xmlns:a14="http://schemas.microsoft.com/office/drawing/2010/main" xmlns:ma14="http://schemas.microsoft.com/office/mac/drawingml/2011/main" val="1"/>
             </a:ext>
           </a:extLst>
         </p:spPr>
@@ -10636,7 +10719,7 @@
           </a:ln>
           <a:extLst>
             <a:ext uri="{C572A759-6A51-4108-AA02-DFA0A04FC94B}">
-              <ma14:wrappingTextBoxFlag xmlns:ma14="http://schemas.microsoft.com/office/mac/drawingml/2011/main" xmlns:a14="http://schemas.microsoft.com/office/drawing/2010/main" xmlns:m="http://schemas.openxmlformats.org/officeDocument/2006/math" xmlns="" val="1"/>
+              <ma14:wrappingTextBoxFlag xmlns="" xmlns:m="http://schemas.openxmlformats.org/officeDocument/2006/math" xmlns:a14="http://schemas.microsoft.com/office/drawing/2010/main" xmlns:ma14="http://schemas.microsoft.com/office/mac/drawingml/2011/main" val="1"/>
             </a:ext>
           </a:extLst>
         </p:spPr>
@@ -10840,7 +10923,7 @@
           </a:ln>
           <a:extLst>
             <a:ext uri="{C572A759-6A51-4108-AA02-DFA0A04FC94B}">
-              <ma14:wrappingTextBoxFlag xmlns:ma14="http://schemas.microsoft.com/office/mac/drawingml/2011/main" xmlns:a14="http://schemas.microsoft.com/office/drawing/2010/main" xmlns:m="http://schemas.openxmlformats.org/officeDocument/2006/math" xmlns="" val="1"/>
+              <ma14:wrappingTextBoxFlag xmlns="" xmlns:m="http://schemas.openxmlformats.org/officeDocument/2006/math" xmlns:a14="http://schemas.microsoft.com/office/drawing/2010/main" xmlns:ma14="http://schemas.microsoft.com/office/mac/drawingml/2011/main" val="1"/>
             </a:ext>
           </a:extLst>
         </p:spPr>
@@ -10902,7 +10985,7 @@
           </a:ln>
           <a:extLst>
             <a:ext uri="{C572A759-6A51-4108-AA02-DFA0A04FC94B}">
-              <ma14:wrappingTextBoxFlag xmlns:ma14="http://schemas.microsoft.com/office/mac/drawingml/2011/main" xmlns:a14="http://schemas.microsoft.com/office/drawing/2010/main" xmlns:m="http://schemas.openxmlformats.org/officeDocument/2006/math" xmlns="" val="1"/>
+              <ma14:wrappingTextBoxFlag xmlns="" xmlns:m="http://schemas.openxmlformats.org/officeDocument/2006/math" xmlns:a14="http://schemas.microsoft.com/office/drawing/2010/main" xmlns:ma14="http://schemas.microsoft.com/office/mac/drawingml/2011/main" val="1"/>
             </a:ext>
           </a:extLst>
         </p:spPr>
@@ -10964,7 +11047,7 @@
           </a:ln>
           <a:extLst>
             <a:ext uri="{C572A759-6A51-4108-AA02-DFA0A04FC94B}">
-              <ma14:wrappingTextBoxFlag xmlns:ma14="http://schemas.microsoft.com/office/mac/drawingml/2011/main" xmlns:a14="http://schemas.microsoft.com/office/drawing/2010/main" xmlns:m="http://schemas.openxmlformats.org/officeDocument/2006/math" xmlns="" val="1"/>
+              <ma14:wrappingTextBoxFlag xmlns="" xmlns:m="http://schemas.openxmlformats.org/officeDocument/2006/math" xmlns:a14="http://schemas.microsoft.com/office/drawing/2010/main" xmlns:ma14="http://schemas.microsoft.com/office/mac/drawingml/2011/main" val="1"/>
             </a:ext>
           </a:extLst>
         </p:spPr>
@@ -11026,7 +11109,7 @@
           </a:ln>
           <a:extLst>
             <a:ext uri="{C572A759-6A51-4108-AA02-DFA0A04FC94B}">
-              <ma14:wrappingTextBoxFlag xmlns:ma14="http://schemas.microsoft.com/office/mac/drawingml/2011/main" xmlns:a14="http://schemas.microsoft.com/office/drawing/2010/main" xmlns:m="http://schemas.openxmlformats.org/officeDocument/2006/math" xmlns="" val="1"/>
+              <ma14:wrappingTextBoxFlag xmlns="" xmlns:m="http://schemas.openxmlformats.org/officeDocument/2006/math" xmlns:a14="http://schemas.microsoft.com/office/drawing/2010/main" xmlns:ma14="http://schemas.microsoft.com/office/mac/drawingml/2011/main" val="1"/>
             </a:ext>
           </a:extLst>
         </p:spPr>
@@ -11065,7 +11148,7 @@
           </a:ln>
           <a:extLst>
             <a:ext uri="{C572A759-6A51-4108-AA02-DFA0A04FC94B}">
-              <ma14:wrappingTextBoxFlag xmlns:ma14="http://schemas.microsoft.com/office/mac/drawingml/2011/main" xmlns:a14="http://schemas.microsoft.com/office/drawing/2010/main" xmlns:m="http://schemas.openxmlformats.org/officeDocument/2006/math" xmlns="" val="1"/>
+              <ma14:wrappingTextBoxFlag xmlns="" xmlns:m="http://schemas.openxmlformats.org/officeDocument/2006/math" xmlns:a14="http://schemas.microsoft.com/office/drawing/2010/main" xmlns:ma14="http://schemas.microsoft.com/office/mac/drawingml/2011/main" val="1"/>
             </a:ext>
           </a:extLst>
         </p:spPr>
@@ -11104,7 +11187,7 @@
           </a:ln>
           <a:extLst>
             <a:ext uri="{C572A759-6A51-4108-AA02-DFA0A04FC94B}">
-              <ma14:wrappingTextBoxFlag xmlns:ma14="http://schemas.microsoft.com/office/mac/drawingml/2011/main" xmlns:a14="http://schemas.microsoft.com/office/drawing/2010/main" xmlns:m="http://schemas.openxmlformats.org/officeDocument/2006/math" xmlns="" val="1"/>
+              <ma14:wrappingTextBoxFlag xmlns="" xmlns:m="http://schemas.openxmlformats.org/officeDocument/2006/math" xmlns:a14="http://schemas.microsoft.com/office/drawing/2010/main" xmlns:ma14="http://schemas.microsoft.com/office/mac/drawingml/2011/main" val="1"/>
             </a:ext>
           </a:extLst>
         </p:spPr>
@@ -11147,7 +11230,7 @@
           </a:ln>
           <a:extLst>
             <a:ext uri="{C572A759-6A51-4108-AA02-DFA0A04FC94B}">
-              <ma14:wrappingTextBoxFlag xmlns:ma14="http://schemas.microsoft.com/office/mac/drawingml/2011/main" xmlns:a14="http://schemas.microsoft.com/office/drawing/2010/main" xmlns:m="http://schemas.openxmlformats.org/officeDocument/2006/math" xmlns="" val="1"/>
+              <ma14:wrappingTextBoxFlag xmlns="" xmlns:m="http://schemas.openxmlformats.org/officeDocument/2006/math" xmlns:a14="http://schemas.microsoft.com/office/drawing/2010/main" xmlns:ma14="http://schemas.microsoft.com/office/mac/drawingml/2011/main" val="1"/>
             </a:ext>
           </a:extLst>
         </p:spPr>
@@ -11190,7 +11273,7 @@
           </a:ln>
           <a:extLst>
             <a:ext uri="{C572A759-6A51-4108-AA02-DFA0A04FC94B}">
-              <ma14:wrappingTextBoxFlag xmlns:ma14="http://schemas.microsoft.com/office/mac/drawingml/2011/main" xmlns:a14="http://schemas.microsoft.com/office/drawing/2010/main" xmlns:m="http://schemas.openxmlformats.org/officeDocument/2006/math" xmlns="" val="1"/>
+              <ma14:wrappingTextBoxFlag xmlns="" xmlns:m="http://schemas.openxmlformats.org/officeDocument/2006/math" xmlns:a14="http://schemas.microsoft.com/office/drawing/2010/main" xmlns:ma14="http://schemas.microsoft.com/office/mac/drawingml/2011/main" val="1"/>
             </a:ext>
           </a:extLst>
         </p:spPr>
@@ -11244,7 +11327,7 @@
           </a:ln>
           <a:extLst>
             <a:ext uri="{C572A759-6A51-4108-AA02-DFA0A04FC94B}">
-              <ma14:wrappingTextBoxFlag xmlns:ma14="http://schemas.microsoft.com/office/mac/drawingml/2011/main" xmlns:a14="http://schemas.microsoft.com/office/drawing/2010/main" xmlns:m="http://schemas.openxmlformats.org/officeDocument/2006/math" xmlns="" val="1"/>
+              <ma14:wrappingTextBoxFlag xmlns="" xmlns:m="http://schemas.openxmlformats.org/officeDocument/2006/math" xmlns:a14="http://schemas.microsoft.com/office/drawing/2010/main" xmlns:ma14="http://schemas.microsoft.com/office/mac/drawingml/2011/main" val="1"/>
             </a:ext>
           </a:extLst>
         </p:spPr>
@@ -11298,7 +11381,7 @@
           </a:ln>
           <a:extLst>
             <a:ext uri="{C572A759-6A51-4108-AA02-DFA0A04FC94B}">
-              <ma14:wrappingTextBoxFlag xmlns:ma14="http://schemas.microsoft.com/office/mac/drawingml/2011/main" xmlns:a14="http://schemas.microsoft.com/office/drawing/2010/main" xmlns:m="http://schemas.openxmlformats.org/officeDocument/2006/math" xmlns="" val="1"/>
+              <ma14:wrappingTextBoxFlag xmlns="" xmlns:m="http://schemas.openxmlformats.org/officeDocument/2006/math" xmlns:a14="http://schemas.microsoft.com/office/drawing/2010/main" xmlns:ma14="http://schemas.microsoft.com/office/mac/drawingml/2011/main" val="1"/>
             </a:ext>
           </a:extLst>
         </p:spPr>
@@ -11351,7 +11434,7 @@
           </a:ln>
           <a:extLst>
             <a:ext uri="{C572A759-6A51-4108-AA02-DFA0A04FC94B}">
-              <ma14:wrappingTextBoxFlag xmlns:ma14="http://schemas.microsoft.com/office/mac/drawingml/2011/main" xmlns:a14="http://schemas.microsoft.com/office/drawing/2010/main" xmlns:m="http://schemas.openxmlformats.org/officeDocument/2006/math" xmlns="" val="1"/>
+              <ma14:wrappingTextBoxFlag xmlns="" xmlns:m="http://schemas.openxmlformats.org/officeDocument/2006/math" xmlns:a14="http://schemas.microsoft.com/office/drawing/2010/main" xmlns:ma14="http://schemas.microsoft.com/office/mac/drawingml/2011/main" val="1"/>
             </a:ext>
           </a:extLst>
         </p:spPr>
@@ -11405,7 +11488,7 @@
           </a:ln>
           <a:extLst>
             <a:ext uri="{C572A759-6A51-4108-AA02-DFA0A04FC94B}">
-              <ma14:wrappingTextBoxFlag xmlns:ma14="http://schemas.microsoft.com/office/mac/drawingml/2011/main" xmlns:a14="http://schemas.microsoft.com/office/drawing/2010/main" xmlns:m="http://schemas.openxmlformats.org/officeDocument/2006/math" xmlns="" val="1"/>
+              <ma14:wrappingTextBoxFlag xmlns="" xmlns:m="http://schemas.openxmlformats.org/officeDocument/2006/math" xmlns:a14="http://schemas.microsoft.com/office/drawing/2010/main" xmlns:ma14="http://schemas.microsoft.com/office/mac/drawingml/2011/main" val="1"/>
             </a:ext>
           </a:extLst>
         </p:spPr>
@@ -11458,7 +11541,7 @@
           </a:ln>
           <a:extLst>
             <a:ext uri="{C572A759-6A51-4108-AA02-DFA0A04FC94B}">
-              <ma14:wrappingTextBoxFlag xmlns:ma14="http://schemas.microsoft.com/office/mac/drawingml/2011/main" xmlns:a14="http://schemas.microsoft.com/office/drawing/2010/main" xmlns:m="http://schemas.openxmlformats.org/officeDocument/2006/math" xmlns="" val="1"/>
+              <ma14:wrappingTextBoxFlag xmlns="" xmlns:m="http://schemas.openxmlformats.org/officeDocument/2006/math" xmlns:a14="http://schemas.microsoft.com/office/drawing/2010/main" xmlns:ma14="http://schemas.microsoft.com/office/mac/drawingml/2011/main" val="1"/>
             </a:ext>
           </a:extLst>
         </p:spPr>
@@ -11508,7 +11591,7 @@
           </a:ln>
           <a:extLst>
             <a:ext uri="{C572A759-6A51-4108-AA02-DFA0A04FC94B}">
-              <ma14:wrappingTextBoxFlag xmlns:ma14="http://schemas.microsoft.com/office/mac/drawingml/2011/main" xmlns:a14="http://schemas.microsoft.com/office/drawing/2010/main" xmlns:m="http://schemas.openxmlformats.org/officeDocument/2006/math" xmlns="" val="1"/>
+              <ma14:wrappingTextBoxFlag xmlns="" xmlns:m="http://schemas.openxmlformats.org/officeDocument/2006/math" xmlns:a14="http://schemas.microsoft.com/office/drawing/2010/main" xmlns:ma14="http://schemas.microsoft.com/office/mac/drawingml/2011/main" val="1"/>
             </a:ext>
           </a:extLst>
         </p:spPr>
@@ -11552,7 +11635,7 @@
           </a:ln>
           <a:extLst>
             <a:ext uri="{C572A759-6A51-4108-AA02-DFA0A04FC94B}">
-              <ma14:wrappingTextBoxFlag xmlns:ma14="http://schemas.microsoft.com/office/mac/drawingml/2011/main" xmlns:a14="http://schemas.microsoft.com/office/drawing/2010/main" xmlns:m="http://schemas.openxmlformats.org/officeDocument/2006/math" xmlns="" val="1"/>
+              <ma14:wrappingTextBoxFlag xmlns="" xmlns:m="http://schemas.openxmlformats.org/officeDocument/2006/math" xmlns:a14="http://schemas.microsoft.com/office/drawing/2010/main" xmlns:ma14="http://schemas.microsoft.com/office/mac/drawingml/2011/main" val="1"/>
             </a:ext>
           </a:extLst>
         </p:spPr>
@@ -11596,7 +11679,7 @@
           </a:ln>
           <a:extLst>
             <a:ext uri="{C572A759-6A51-4108-AA02-DFA0A04FC94B}">
-              <ma14:wrappingTextBoxFlag xmlns:ma14="http://schemas.microsoft.com/office/mac/drawingml/2011/main" xmlns:a14="http://schemas.microsoft.com/office/drawing/2010/main" xmlns:m="http://schemas.openxmlformats.org/officeDocument/2006/math" xmlns="" val="1"/>
+              <ma14:wrappingTextBoxFlag xmlns="" xmlns:m="http://schemas.openxmlformats.org/officeDocument/2006/math" xmlns:a14="http://schemas.microsoft.com/office/drawing/2010/main" xmlns:ma14="http://schemas.microsoft.com/office/mac/drawingml/2011/main" val="1"/>
             </a:ext>
           </a:extLst>
         </p:spPr>
@@ -11640,7 +11723,7 @@
           </a:ln>
           <a:extLst>
             <a:ext uri="{C572A759-6A51-4108-AA02-DFA0A04FC94B}">
-              <ma14:wrappingTextBoxFlag xmlns:ma14="http://schemas.microsoft.com/office/mac/drawingml/2011/main" xmlns:a14="http://schemas.microsoft.com/office/drawing/2010/main" xmlns:m="http://schemas.openxmlformats.org/officeDocument/2006/math" xmlns="" val="1"/>
+              <ma14:wrappingTextBoxFlag xmlns="" xmlns:m="http://schemas.openxmlformats.org/officeDocument/2006/math" xmlns:a14="http://schemas.microsoft.com/office/drawing/2010/main" xmlns:ma14="http://schemas.microsoft.com/office/mac/drawingml/2011/main" val="1"/>
             </a:ext>
           </a:extLst>
         </p:spPr>
@@ -11684,7 +11767,7 @@
           </a:ln>
           <a:extLst>
             <a:ext uri="{C572A759-6A51-4108-AA02-DFA0A04FC94B}">
-              <ma14:wrappingTextBoxFlag xmlns:ma14="http://schemas.microsoft.com/office/mac/drawingml/2011/main" xmlns:a14="http://schemas.microsoft.com/office/drawing/2010/main" xmlns:m="http://schemas.openxmlformats.org/officeDocument/2006/math" xmlns="" val="1"/>
+              <ma14:wrappingTextBoxFlag xmlns="" xmlns:m="http://schemas.openxmlformats.org/officeDocument/2006/math" xmlns:a14="http://schemas.microsoft.com/office/drawing/2010/main" xmlns:ma14="http://schemas.microsoft.com/office/mac/drawingml/2011/main" val="1"/>
             </a:ext>
           </a:extLst>
         </p:spPr>
@@ -11728,7 +11811,7 @@
           </a:ln>
           <a:extLst>
             <a:ext uri="{C572A759-6A51-4108-AA02-DFA0A04FC94B}">
-              <ma14:wrappingTextBoxFlag xmlns:ma14="http://schemas.microsoft.com/office/mac/drawingml/2011/main" xmlns:a14="http://schemas.microsoft.com/office/drawing/2010/main" xmlns:m="http://schemas.openxmlformats.org/officeDocument/2006/math" xmlns="" val="1"/>
+              <ma14:wrappingTextBoxFlag xmlns="" xmlns:m="http://schemas.openxmlformats.org/officeDocument/2006/math" xmlns:a14="http://schemas.microsoft.com/office/drawing/2010/main" xmlns:ma14="http://schemas.microsoft.com/office/mac/drawingml/2011/main" val="1"/>
             </a:ext>
           </a:extLst>
         </p:spPr>
@@ -11772,7 +11855,7 @@
           </a:ln>
           <a:extLst>
             <a:ext uri="{C572A759-6A51-4108-AA02-DFA0A04FC94B}">
-              <ma14:wrappingTextBoxFlag xmlns:ma14="http://schemas.microsoft.com/office/mac/drawingml/2011/main" xmlns:a14="http://schemas.microsoft.com/office/drawing/2010/main" xmlns:m="http://schemas.openxmlformats.org/officeDocument/2006/math" xmlns="" val="1"/>
+              <ma14:wrappingTextBoxFlag xmlns="" xmlns:m="http://schemas.openxmlformats.org/officeDocument/2006/math" xmlns:a14="http://schemas.microsoft.com/office/drawing/2010/main" xmlns:ma14="http://schemas.microsoft.com/office/mac/drawingml/2011/main" val="1"/>
             </a:ext>
           </a:extLst>
         </p:spPr>
@@ -11816,7 +11899,7 @@
           </a:ln>
           <a:extLst>
             <a:ext uri="{C572A759-6A51-4108-AA02-DFA0A04FC94B}">
-              <ma14:wrappingTextBoxFlag xmlns:ma14="http://schemas.microsoft.com/office/mac/drawingml/2011/main" xmlns:a14="http://schemas.microsoft.com/office/drawing/2010/main" xmlns:m="http://schemas.openxmlformats.org/officeDocument/2006/math" xmlns="" val="1"/>
+              <ma14:wrappingTextBoxFlag xmlns="" xmlns:m="http://schemas.openxmlformats.org/officeDocument/2006/math" xmlns:a14="http://schemas.microsoft.com/office/drawing/2010/main" xmlns:ma14="http://schemas.microsoft.com/office/mac/drawingml/2011/main" val="1"/>
             </a:ext>
           </a:extLst>
         </p:spPr>
@@ -12384,7 +12467,7 @@
           </a:ln>
           <a:extLst>
             <a:ext uri="{C572A759-6A51-4108-AA02-DFA0A04FC94B}">
-              <ma14:wrappingTextBoxFlag xmlns:ma14="http://schemas.microsoft.com/office/mac/drawingml/2011/main" xmlns:a14="http://schemas.microsoft.com/office/drawing/2010/main" xmlns:m="http://schemas.openxmlformats.org/officeDocument/2006/math" xmlns="" val="1"/>
+              <ma14:wrappingTextBoxFlag xmlns="" xmlns:m="http://schemas.openxmlformats.org/officeDocument/2006/math" xmlns:a14="http://schemas.microsoft.com/office/drawing/2010/main" xmlns:ma14="http://schemas.microsoft.com/office/mac/drawingml/2011/main" val="1"/>
             </a:ext>
           </a:extLst>
         </p:spPr>
@@ -12766,7 +12849,7 @@
           </a:ln>
           <a:extLst>
             <a:ext uri="{C572A759-6A51-4108-AA02-DFA0A04FC94B}">
-              <ma14:wrappingTextBoxFlag xmlns:ma14="http://schemas.microsoft.com/office/mac/drawingml/2011/main" xmlns:a14="http://schemas.microsoft.com/office/drawing/2010/main" xmlns:m="http://schemas.openxmlformats.org/officeDocument/2006/math" xmlns="" val="1"/>
+              <ma14:wrappingTextBoxFlag xmlns="" xmlns:m="http://schemas.openxmlformats.org/officeDocument/2006/math" xmlns:a14="http://schemas.microsoft.com/office/drawing/2010/main" xmlns:ma14="http://schemas.microsoft.com/office/mac/drawingml/2011/main" val="1"/>
             </a:ext>
           </a:extLst>
         </p:spPr>
@@ -12872,7 +12955,7 @@
           </a:ln>
           <a:extLst>
             <a:ext uri="{C572A759-6A51-4108-AA02-DFA0A04FC94B}">
-              <ma14:wrappingTextBoxFlag xmlns:ma14="http://schemas.microsoft.com/office/mac/drawingml/2011/main" xmlns:a14="http://schemas.microsoft.com/office/drawing/2010/main" xmlns:m="http://schemas.openxmlformats.org/officeDocument/2006/math" xmlns="" val="1"/>
+              <ma14:wrappingTextBoxFlag xmlns="" xmlns:m="http://schemas.openxmlformats.org/officeDocument/2006/math" xmlns:a14="http://schemas.microsoft.com/office/drawing/2010/main" xmlns:ma14="http://schemas.microsoft.com/office/mac/drawingml/2011/main" val="1"/>
             </a:ext>
           </a:extLst>
         </p:spPr>
@@ -13267,7 +13350,7 @@
           </a:ln>
           <a:extLst>
             <a:ext uri="{C572A759-6A51-4108-AA02-DFA0A04FC94B}">
-              <ma14:wrappingTextBoxFlag xmlns:ma14="http://schemas.microsoft.com/office/mac/drawingml/2011/main" xmlns:a14="http://schemas.microsoft.com/office/drawing/2010/main" xmlns:m="http://schemas.openxmlformats.org/officeDocument/2006/math" xmlns="" val="1"/>
+              <ma14:wrappingTextBoxFlag xmlns="" xmlns:m="http://schemas.openxmlformats.org/officeDocument/2006/math" xmlns:a14="http://schemas.microsoft.com/office/drawing/2010/main" xmlns:ma14="http://schemas.microsoft.com/office/mac/drawingml/2011/main" val="1"/>
             </a:ext>
           </a:extLst>
         </p:spPr>
@@ -13314,7 +13397,7 @@
           </a:ln>
           <a:extLst>
             <a:ext uri="{C572A759-6A51-4108-AA02-DFA0A04FC94B}">
-              <ma14:wrappingTextBoxFlag xmlns:ma14="http://schemas.microsoft.com/office/mac/drawingml/2011/main" xmlns:a14="http://schemas.microsoft.com/office/drawing/2010/main" xmlns:m="http://schemas.openxmlformats.org/officeDocument/2006/math" xmlns="" val="1"/>
+              <ma14:wrappingTextBoxFlag xmlns="" xmlns:m="http://schemas.openxmlformats.org/officeDocument/2006/math" xmlns:a14="http://schemas.microsoft.com/office/drawing/2010/main" xmlns:ma14="http://schemas.microsoft.com/office/mac/drawingml/2011/main" val="1"/>
             </a:ext>
           </a:extLst>
         </p:spPr>
@@ -13406,7 +13489,7 @@
           </a:ln>
           <a:extLst>
             <a:ext uri="{C572A759-6A51-4108-AA02-DFA0A04FC94B}">
-              <ma14:wrappingTextBoxFlag xmlns:ma14="http://schemas.microsoft.com/office/mac/drawingml/2011/main" xmlns:a14="http://schemas.microsoft.com/office/drawing/2010/main" xmlns:m="http://schemas.openxmlformats.org/officeDocument/2006/math" xmlns="" val="1"/>
+              <ma14:wrappingTextBoxFlag xmlns="" xmlns:m="http://schemas.openxmlformats.org/officeDocument/2006/math" xmlns:a14="http://schemas.microsoft.com/office/drawing/2010/main" xmlns:ma14="http://schemas.microsoft.com/office/mac/drawingml/2011/main" val="1"/>
             </a:ext>
           </a:extLst>
         </p:spPr>
@@ -13557,7 +13640,7 @@
           </a:ln>
           <a:extLst>
             <a:ext uri="{C572A759-6A51-4108-AA02-DFA0A04FC94B}">
-              <ma14:wrappingTextBoxFlag xmlns:ma14="http://schemas.microsoft.com/office/mac/drawingml/2011/main" xmlns:a14="http://schemas.microsoft.com/office/drawing/2010/main" xmlns:m="http://schemas.openxmlformats.org/officeDocument/2006/math" xmlns="" val="1"/>
+              <ma14:wrappingTextBoxFlag xmlns="" xmlns:m="http://schemas.openxmlformats.org/officeDocument/2006/math" xmlns:a14="http://schemas.microsoft.com/office/drawing/2010/main" xmlns:ma14="http://schemas.microsoft.com/office/mac/drawingml/2011/main" val="1"/>
             </a:ext>
           </a:extLst>
         </p:spPr>
@@ -13862,7 +13945,7 @@
           </a:ln>
           <a:extLst>
             <a:ext uri="{C572A759-6A51-4108-AA02-DFA0A04FC94B}">
-              <ma14:wrappingTextBoxFlag xmlns:ma14="http://schemas.microsoft.com/office/mac/drawingml/2011/main" xmlns:a14="http://schemas.microsoft.com/office/drawing/2010/main" xmlns:m="http://schemas.openxmlformats.org/officeDocument/2006/math" xmlns="" val="1"/>
+              <ma14:wrappingTextBoxFlag xmlns="" xmlns:m="http://schemas.openxmlformats.org/officeDocument/2006/math" xmlns:a14="http://schemas.microsoft.com/office/drawing/2010/main" xmlns:ma14="http://schemas.microsoft.com/office/mac/drawingml/2011/main" val="1"/>
             </a:ext>
           </a:extLst>
         </p:spPr>
@@ -14446,7 +14529,7 @@
           </a:ln>
           <a:extLst>
             <a:ext uri="{C572A759-6A51-4108-AA02-DFA0A04FC94B}">
-              <ma14:wrappingTextBoxFlag xmlns:ma14="http://schemas.microsoft.com/office/mac/drawingml/2011/main" xmlns:a14="http://schemas.microsoft.com/office/drawing/2010/main" xmlns:m="http://schemas.openxmlformats.org/officeDocument/2006/math" xmlns="" val="1"/>
+              <ma14:wrappingTextBoxFlag xmlns="" xmlns:m="http://schemas.openxmlformats.org/officeDocument/2006/math" xmlns:a14="http://schemas.microsoft.com/office/drawing/2010/main" xmlns:ma14="http://schemas.microsoft.com/office/mac/drawingml/2011/main" val="1"/>
             </a:ext>
           </a:extLst>
         </p:spPr>
@@ -14722,7 +14805,7 @@
           </a:ln>
           <a:extLst>
             <a:ext uri="{C572A759-6A51-4108-AA02-DFA0A04FC94B}">
-              <ma14:wrappingTextBoxFlag xmlns:ma14="http://schemas.microsoft.com/office/mac/drawingml/2011/main" xmlns:a14="http://schemas.microsoft.com/office/drawing/2010/main" xmlns:m="http://schemas.openxmlformats.org/officeDocument/2006/math" xmlns="" val="1"/>
+              <ma14:wrappingTextBoxFlag xmlns="" xmlns:m="http://schemas.openxmlformats.org/officeDocument/2006/math" xmlns:a14="http://schemas.microsoft.com/office/drawing/2010/main" xmlns:ma14="http://schemas.microsoft.com/office/mac/drawingml/2011/main" val="1"/>
             </a:ext>
           </a:extLst>
         </p:spPr>
@@ -14937,7 +15020,7 @@
           </a:ln>
           <a:extLst>
             <a:ext uri="{C572A759-6A51-4108-AA02-DFA0A04FC94B}">
-              <ma14:wrappingTextBoxFlag xmlns:ma14="http://schemas.microsoft.com/office/mac/drawingml/2011/main" xmlns:a14="http://schemas.microsoft.com/office/drawing/2010/main" xmlns:m="http://schemas.openxmlformats.org/officeDocument/2006/math" xmlns="" val="1"/>
+              <ma14:wrappingTextBoxFlag xmlns="" xmlns:m="http://schemas.openxmlformats.org/officeDocument/2006/math" xmlns:a14="http://schemas.microsoft.com/office/drawing/2010/main" xmlns:ma14="http://schemas.microsoft.com/office/mac/drawingml/2011/main" val="1"/>
             </a:ext>
           </a:extLst>
         </p:spPr>
@@ -15300,7 +15383,7 @@
           </a:ln>
           <a:extLst>
             <a:ext uri="{C572A759-6A51-4108-AA02-DFA0A04FC94B}">
-              <ma14:wrappingTextBoxFlag xmlns:ma14="http://schemas.microsoft.com/office/mac/drawingml/2011/main" xmlns:a14="http://schemas.microsoft.com/office/drawing/2010/main" xmlns:m="http://schemas.openxmlformats.org/officeDocument/2006/math" xmlns="" val="1"/>
+              <ma14:wrappingTextBoxFlag xmlns="" xmlns:m="http://schemas.openxmlformats.org/officeDocument/2006/math" xmlns:a14="http://schemas.microsoft.com/office/drawing/2010/main" xmlns:ma14="http://schemas.microsoft.com/office/mac/drawingml/2011/main" val="1"/>
             </a:ext>
           </a:extLst>
         </p:spPr>
@@ -15604,7 +15687,7 @@
           </a:ln>
           <a:extLst>
             <a:ext uri="{C572A759-6A51-4108-AA02-DFA0A04FC94B}">
-              <ma14:wrappingTextBoxFlag xmlns:ma14="http://schemas.microsoft.com/office/mac/drawingml/2011/main" xmlns:a14="http://schemas.microsoft.com/office/drawing/2010/main" xmlns:m="http://schemas.openxmlformats.org/officeDocument/2006/math" xmlns="" val="1"/>
+              <ma14:wrappingTextBoxFlag xmlns="" xmlns:m="http://schemas.openxmlformats.org/officeDocument/2006/math" xmlns:a14="http://schemas.microsoft.com/office/drawing/2010/main" xmlns:ma14="http://schemas.microsoft.com/office/mac/drawingml/2011/main" val="1"/>
             </a:ext>
           </a:extLst>
         </p:spPr>
@@ -15732,7 +15815,7 @@
           </a:ln>
           <a:extLst>
             <a:ext uri="{C572A759-6A51-4108-AA02-DFA0A04FC94B}">
-              <ma14:wrappingTextBoxFlag xmlns:ma14="http://schemas.microsoft.com/office/mac/drawingml/2011/main" xmlns:a14="http://schemas.microsoft.com/office/drawing/2010/main" xmlns:m="http://schemas.openxmlformats.org/officeDocument/2006/math" xmlns="" val="1"/>
+              <ma14:wrappingTextBoxFlag xmlns="" xmlns:m="http://schemas.openxmlformats.org/officeDocument/2006/math" xmlns:a14="http://schemas.microsoft.com/office/drawing/2010/main" xmlns:ma14="http://schemas.microsoft.com/office/mac/drawingml/2011/main" val="1"/>
             </a:ext>
           </a:extLst>
         </p:spPr>
@@ -15863,7 +15946,7 @@
           </a:ln>
           <a:extLst>
             <a:ext uri="{C572A759-6A51-4108-AA02-DFA0A04FC94B}">
-              <ma14:wrappingTextBoxFlag xmlns:ma14="http://schemas.microsoft.com/office/mac/drawingml/2011/main" xmlns:a14="http://schemas.microsoft.com/office/drawing/2010/main" xmlns:m="http://schemas.openxmlformats.org/officeDocument/2006/math" xmlns="" val="1"/>
+              <ma14:wrappingTextBoxFlag xmlns="" xmlns:m="http://schemas.openxmlformats.org/officeDocument/2006/math" xmlns:a14="http://schemas.microsoft.com/office/drawing/2010/main" xmlns:ma14="http://schemas.microsoft.com/office/mac/drawingml/2011/main" val="1"/>
             </a:ext>
           </a:extLst>
         </p:spPr>
@@ -16260,7 +16343,7 @@
           </a:ln>
           <a:extLst>
             <a:ext uri="{C572A759-6A51-4108-AA02-DFA0A04FC94B}">
-              <ma14:wrappingTextBoxFlag xmlns:ma14="http://schemas.microsoft.com/office/mac/drawingml/2011/main" xmlns:a14="http://schemas.microsoft.com/office/drawing/2010/main" xmlns:m="http://schemas.openxmlformats.org/officeDocument/2006/math" xmlns="" val="1"/>
+              <ma14:wrappingTextBoxFlag xmlns="" xmlns:m="http://schemas.openxmlformats.org/officeDocument/2006/math" xmlns:a14="http://schemas.microsoft.com/office/drawing/2010/main" xmlns:ma14="http://schemas.microsoft.com/office/mac/drawingml/2011/main" val="1"/>
             </a:ext>
           </a:extLst>
         </p:spPr>
@@ -16304,7 +16387,7 @@
           </a:ln>
           <a:extLst>
             <a:ext uri="{C572A759-6A51-4108-AA02-DFA0A04FC94B}">
-              <ma14:wrappingTextBoxFlag xmlns:ma14="http://schemas.microsoft.com/office/mac/drawingml/2011/main" xmlns:a14="http://schemas.microsoft.com/office/drawing/2010/main" xmlns:m="http://schemas.openxmlformats.org/officeDocument/2006/math" xmlns="" val="1"/>
+              <ma14:wrappingTextBoxFlag xmlns="" xmlns:m="http://schemas.openxmlformats.org/officeDocument/2006/math" xmlns:a14="http://schemas.microsoft.com/office/drawing/2010/main" xmlns:ma14="http://schemas.microsoft.com/office/mac/drawingml/2011/main" val="1"/>
             </a:ext>
           </a:extLst>
         </p:spPr>
@@ -16348,7 +16431,7 @@
           </a:ln>
           <a:extLst>
             <a:ext uri="{C572A759-6A51-4108-AA02-DFA0A04FC94B}">
-              <ma14:wrappingTextBoxFlag xmlns:ma14="http://schemas.microsoft.com/office/mac/drawingml/2011/main" xmlns:a14="http://schemas.microsoft.com/office/drawing/2010/main" xmlns:m="http://schemas.openxmlformats.org/officeDocument/2006/math" xmlns="" val="1"/>
+              <ma14:wrappingTextBoxFlag xmlns="" xmlns:m="http://schemas.openxmlformats.org/officeDocument/2006/math" xmlns:a14="http://schemas.microsoft.com/office/drawing/2010/main" xmlns:ma14="http://schemas.microsoft.com/office/mac/drawingml/2011/main" val="1"/>
             </a:ext>
           </a:extLst>
         </p:spPr>
@@ -16392,7 +16475,7 @@
           </a:ln>
           <a:extLst>
             <a:ext uri="{C572A759-6A51-4108-AA02-DFA0A04FC94B}">
-              <ma14:wrappingTextBoxFlag xmlns:ma14="http://schemas.microsoft.com/office/mac/drawingml/2011/main" xmlns:a14="http://schemas.microsoft.com/office/drawing/2010/main" xmlns:m="http://schemas.openxmlformats.org/officeDocument/2006/math" xmlns="" val="1"/>
+              <ma14:wrappingTextBoxFlag xmlns="" xmlns:m="http://schemas.openxmlformats.org/officeDocument/2006/math" xmlns:a14="http://schemas.microsoft.com/office/drawing/2010/main" xmlns:ma14="http://schemas.microsoft.com/office/mac/drawingml/2011/main" val="1"/>
             </a:ext>
           </a:extLst>
         </p:spPr>
@@ -16431,7 +16514,7 @@
           </a:ln>
           <a:extLst>
             <a:ext uri="{C572A759-6A51-4108-AA02-DFA0A04FC94B}">
-              <ma14:wrappingTextBoxFlag xmlns:ma14="http://schemas.microsoft.com/office/mac/drawingml/2011/main" xmlns:a14="http://schemas.microsoft.com/office/drawing/2010/main" xmlns:m="http://schemas.openxmlformats.org/officeDocument/2006/math" xmlns="" val="1"/>
+              <ma14:wrappingTextBoxFlag xmlns="" xmlns:m="http://schemas.openxmlformats.org/officeDocument/2006/math" xmlns:a14="http://schemas.microsoft.com/office/drawing/2010/main" xmlns:ma14="http://schemas.microsoft.com/office/mac/drawingml/2011/main" val="1"/>
             </a:ext>
           </a:extLst>
         </p:spPr>
@@ -16493,7 +16576,7 @@
           </a:ln>
           <a:extLst>
             <a:ext uri="{C572A759-6A51-4108-AA02-DFA0A04FC94B}">
-              <ma14:wrappingTextBoxFlag xmlns:ma14="http://schemas.microsoft.com/office/mac/drawingml/2011/main" xmlns:a14="http://schemas.microsoft.com/office/drawing/2010/main" xmlns:m="http://schemas.openxmlformats.org/officeDocument/2006/math" xmlns="" val="1"/>
+              <ma14:wrappingTextBoxFlag xmlns="" xmlns:m="http://schemas.openxmlformats.org/officeDocument/2006/math" xmlns:a14="http://schemas.microsoft.com/office/drawing/2010/main" xmlns:ma14="http://schemas.microsoft.com/office/mac/drawingml/2011/main" val="1"/>
             </a:ext>
           </a:extLst>
         </p:spPr>
@@ -16528,7 +16611,7 @@
           </a:ln>
           <a:extLst>
             <a:ext uri="{C572A759-6A51-4108-AA02-DFA0A04FC94B}">
-              <ma14:wrappingTextBoxFlag xmlns:ma14="http://schemas.microsoft.com/office/mac/drawingml/2011/main" xmlns:a14="http://schemas.microsoft.com/office/drawing/2010/main" xmlns:m="http://schemas.openxmlformats.org/officeDocument/2006/math" xmlns="" val="1"/>
+              <ma14:wrappingTextBoxFlag xmlns="" xmlns:m="http://schemas.openxmlformats.org/officeDocument/2006/math" xmlns:a14="http://schemas.microsoft.com/office/drawing/2010/main" xmlns:ma14="http://schemas.microsoft.com/office/mac/drawingml/2011/main" val="1"/>
             </a:ext>
           </a:extLst>
         </p:spPr>
@@ -16563,7 +16646,7 @@
           </a:ln>
           <a:extLst>
             <a:ext uri="{C572A759-6A51-4108-AA02-DFA0A04FC94B}">
-              <ma14:wrappingTextBoxFlag xmlns:ma14="http://schemas.microsoft.com/office/mac/drawingml/2011/main" xmlns:a14="http://schemas.microsoft.com/office/drawing/2010/main" xmlns:m="http://schemas.openxmlformats.org/officeDocument/2006/math" xmlns="" val="1"/>
+              <ma14:wrappingTextBoxFlag xmlns="" xmlns:m="http://schemas.openxmlformats.org/officeDocument/2006/math" xmlns:a14="http://schemas.microsoft.com/office/drawing/2010/main" xmlns:ma14="http://schemas.microsoft.com/office/mac/drawingml/2011/main" val="1"/>
             </a:ext>
           </a:extLst>
         </p:spPr>
@@ -16798,7 +16881,7 @@
           </a:ln>
           <a:extLst>
             <a:ext uri="{C572A759-6A51-4108-AA02-DFA0A04FC94B}">
-              <ma14:wrappingTextBoxFlag xmlns:ma14="http://schemas.microsoft.com/office/mac/drawingml/2011/main" xmlns:a14="http://schemas.microsoft.com/office/drawing/2010/main" xmlns:m="http://schemas.openxmlformats.org/officeDocument/2006/math" xmlns="" val="1"/>
+              <ma14:wrappingTextBoxFlag xmlns="" xmlns:m="http://schemas.openxmlformats.org/officeDocument/2006/math" xmlns:a14="http://schemas.microsoft.com/office/drawing/2010/main" xmlns:ma14="http://schemas.microsoft.com/office/mac/drawingml/2011/main" val="1"/>
             </a:ext>
           </a:extLst>
         </p:spPr>
@@ -16837,7 +16920,7 @@
           </a:ln>
           <a:extLst>
             <a:ext uri="{C572A759-6A51-4108-AA02-DFA0A04FC94B}">
-              <ma14:wrappingTextBoxFlag xmlns:ma14="http://schemas.microsoft.com/office/mac/drawingml/2011/main" xmlns:a14="http://schemas.microsoft.com/office/drawing/2010/main" xmlns:m="http://schemas.openxmlformats.org/officeDocument/2006/math" xmlns="" val="1"/>
+              <ma14:wrappingTextBoxFlag xmlns="" xmlns:m="http://schemas.openxmlformats.org/officeDocument/2006/math" xmlns:a14="http://schemas.microsoft.com/office/drawing/2010/main" xmlns:ma14="http://schemas.microsoft.com/office/mac/drawingml/2011/main" val="1"/>
             </a:ext>
           </a:extLst>
         </p:spPr>
@@ -16876,7 +16959,7 @@
           </a:ln>
           <a:extLst>
             <a:ext uri="{C572A759-6A51-4108-AA02-DFA0A04FC94B}">
-              <ma14:wrappingTextBoxFlag xmlns:ma14="http://schemas.microsoft.com/office/mac/drawingml/2011/main" xmlns:a14="http://schemas.microsoft.com/office/drawing/2010/main" xmlns:m="http://schemas.openxmlformats.org/officeDocument/2006/math" xmlns="" val="1"/>
+              <ma14:wrappingTextBoxFlag xmlns="" xmlns:m="http://schemas.openxmlformats.org/officeDocument/2006/math" xmlns:a14="http://schemas.microsoft.com/office/drawing/2010/main" xmlns:ma14="http://schemas.microsoft.com/office/mac/drawingml/2011/main" val="1"/>
             </a:ext>
           </a:extLst>
         </p:spPr>
@@ -16915,7 +16998,7 @@
           </a:ln>
           <a:extLst>
             <a:ext uri="{C572A759-6A51-4108-AA02-DFA0A04FC94B}">
-              <ma14:wrappingTextBoxFlag xmlns:ma14="http://schemas.microsoft.com/office/mac/drawingml/2011/main" xmlns:a14="http://schemas.microsoft.com/office/drawing/2010/main" xmlns:m="http://schemas.openxmlformats.org/officeDocument/2006/math" xmlns="" val="1"/>
+              <ma14:wrappingTextBoxFlag xmlns="" xmlns:m="http://schemas.openxmlformats.org/officeDocument/2006/math" xmlns:a14="http://schemas.microsoft.com/office/drawing/2010/main" xmlns:ma14="http://schemas.microsoft.com/office/mac/drawingml/2011/main" val="1"/>
             </a:ext>
           </a:extLst>
         </p:spPr>
@@ -16961,7 +17044,7 @@
           </a:ln>
           <a:extLst>
             <a:ext uri="{C572A759-6A51-4108-AA02-DFA0A04FC94B}">
-              <ma14:wrappingTextBoxFlag xmlns:ma14="http://schemas.microsoft.com/office/mac/drawingml/2011/main" xmlns:a14="http://schemas.microsoft.com/office/drawing/2010/main" xmlns:m="http://schemas.openxmlformats.org/officeDocument/2006/math" xmlns="" val="1"/>
+              <ma14:wrappingTextBoxFlag xmlns="" xmlns:m="http://schemas.openxmlformats.org/officeDocument/2006/math" xmlns:a14="http://schemas.microsoft.com/office/drawing/2010/main" xmlns:ma14="http://schemas.microsoft.com/office/mac/drawingml/2011/main" val="1"/>
             </a:ext>
           </a:extLst>
         </p:spPr>
@@ -17017,7 +17100,7 @@
           </a:ln>
           <a:extLst>
             <a:ext uri="{C572A759-6A51-4108-AA02-DFA0A04FC94B}">
-              <ma14:wrappingTextBoxFlag xmlns:ma14="http://schemas.microsoft.com/office/mac/drawingml/2011/main" xmlns:a14="http://schemas.microsoft.com/office/drawing/2010/main" xmlns:m="http://schemas.openxmlformats.org/officeDocument/2006/math" xmlns="" val="1"/>
+              <ma14:wrappingTextBoxFlag xmlns="" xmlns:m="http://schemas.openxmlformats.org/officeDocument/2006/math" xmlns:a14="http://schemas.microsoft.com/office/drawing/2010/main" xmlns:ma14="http://schemas.microsoft.com/office/mac/drawingml/2011/main" val="1"/>
             </a:ext>
           </a:extLst>
         </p:spPr>

</xml_diff>